<commit_message>
avances de algo que no existe
</commit_message>
<xml_diff>
--- a/assets uarm/2024 1/metodosInvestigacion/expo tesis 2024.pptx
+++ b/assets uarm/2024 1/metodosInvestigacion/expo tesis 2024.pptx
@@ -12,10 +12,13 @@
     <p:sldId id="262" r:id="rId6"/>
     <p:sldId id="263" r:id="rId7"/>
     <p:sldId id="265" r:id="rId8"/>
-    <p:sldId id="259" r:id="rId9"/>
-    <p:sldId id="266" r:id="rId10"/>
-    <p:sldId id="267" r:id="rId11"/>
-    <p:sldId id="260" r:id="rId12"/>
+    <p:sldId id="271" r:id="rId9"/>
+    <p:sldId id="259" r:id="rId10"/>
+    <p:sldId id="266" r:id="rId11"/>
+    <p:sldId id="267" r:id="rId12"/>
+    <p:sldId id="260" r:id="rId13"/>
+    <p:sldId id="272" r:id="rId14"/>
+    <p:sldId id="270" r:id="rId15"/>
   </p:sldIdLst>
   <p:sldSz cx="12192000" cy="6858000"/>
   <p:notesSz cx="6858000" cy="9144000"/>
@@ -253,7 +256,7 @@
           <a:p>
             <a:fld id="{CC93EEC4-26EE-4EB8-92C8-DC7A3FC3098B}" type="datetimeFigureOut">
               <a:rPr lang="es-PE" smtClean="0"/>
-              <a:t>10/07/2024</a:t>
+              <a:t>17/07/2024</a:t>
             </a:fld>
             <a:endParaRPr lang="es-PE"/>
           </a:p>
@@ -423,7 +426,7 @@
           <a:p>
             <a:fld id="{CC93EEC4-26EE-4EB8-92C8-DC7A3FC3098B}" type="datetimeFigureOut">
               <a:rPr lang="es-PE" smtClean="0"/>
-              <a:t>10/07/2024</a:t>
+              <a:t>17/07/2024</a:t>
             </a:fld>
             <a:endParaRPr lang="es-PE"/>
           </a:p>
@@ -603,7 +606,7 @@
           <a:p>
             <a:fld id="{CC93EEC4-26EE-4EB8-92C8-DC7A3FC3098B}" type="datetimeFigureOut">
               <a:rPr lang="es-PE" smtClean="0"/>
-              <a:t>10/07/2024</a:t>
+              <a:t>17/07/2024</a:t>
             </a:fld>
             <a:endParaRPr lang="es-PE"/>
           </a:p>
@@ -773,7 +776,7 @@
           <a:p>
             <a:fld id="{CC93EEC4-26EE-4EB8-92C8-DC7A3FC3098B}" type="datetimeFigureOut">
               <a:rPr lang="es-PE" smtClean="0"/>
-              <a:t>10/07/2024</a:t>
+              <a:t>17/07/2024</a:t>
             </a:fld>
             <a:endParaRPr lang="es-PE"/>
           </a:p>
@@ -1019,7 +1022,7 @@
           <a:p>
             <a:fld id="{CC93EEC4-26EE-4EB8-92C8-DC7A3FC3098B}" type="datetimeFigureOut">
               <a:rPr lang="es-PE" smtClean="0"/>
-              <a:t>10/07/2024</a:t>
+              <a:t>17/07/2024</a:t>
             </a:fld>
             <a:endParaRPr lang="es-PE"/>
           </a:p>
@@ -1251,7 +1254,7 @@
           <a:p>
             <a:fld id="{CC93EEC4-26EE-4EB8-92C8-DC7A3FC3098B}" type="datetimeFigureOut">
               <a:rPr lang="es-PE" smtClean="0"/>
-              <a:t>10/07/2024</a:t>
+              <a:t>17/07/2024</a:t>
             </a:fld>
             <a:endParaRPr lang="es-PE"/>
           </a:p>
@@ -1618,7 +1621,7 @@
           <a:p>
             <a:fld id="{CC93EEC4-26EE-4EB8-92C8-DC7A3FC3098B}" type="datetimeFigureOut">
               <a:rPr lang="es-PE" smtClean="0"/>
-              <a:t>10/07/2024</a:t>
+              <a:t>17/07/2024</a:t>
             </a:fld>
             <a:endParaRPr lang="es-PE"/>
           </a:p>
@@ -1736,7 +1739,7 @@
           <a:p>
             <a:fld id="{CC93EEC4-26EE-4EB8-92C8-DC7A3FC3098B}" type="datetimeFigureOut">
               <a:rPr lang="es-PE" smtClean="0"/>
-              <a:t>10/07/2024</a:t>
+              <a:t>17/07/2024</a:t>
             </a:fld>
             <a:endParaRPr lang="es-PE"/>
           </a:p>
@@ -1831,7 +1834,7 @@
           <a:p>
             <a:fld id="{CC93EEC4-26EE-4EB8-92C8-DC7A3FC3098B}" type="datetimeFigureOut">
               <a:rPr lang="es-PE" smtClean="0"/>
-              <a:t>10/07/2024</a:t>
+              <a:t>17/07/2024</a:t>
             </a:fld>
             <a:endParaRPr lang="es-PE"/>
           </a:p>
@@ -2108,7 +2111,7 @@
           <a:p>
             <a:fld id="{CC93EEC4-26EE-4EB8-92C8-DC7A3FC3098B}" type="datetimeFigureOut">
               <a:rPr lang="es-PE" smtClean="0"/>
-              <a:t>10/07/2024</a:t>
+              <a:t>17/07/2024</a:t>
             </a:fld>
             <a:endParaRPr lang="es-PE"/>
           </a:p>
@@ -2361,7 +2364,7 @@
           <a:p>
             <a:fld id="{CC93EEC4-26EE-4EB8-92C8-DC7A3FC3098B}" type="datetimeFigureOut">
               <a:rPr lang="es-PE" smtClean="0"/>
-              <a:t>10/07/2024</a:t>
+              <a:t>17/07/2024</a:t>
             </a:fld>
             <a:endParaRPr lang="es-PE"/>
           </a:p>
@@ -2574,7 +2577,7 @@
           <a:p>
             <a:fld id="{CC93EEC4-26EE-4EB8-92C8-DC7A3FC3098B}" type="datetimeFigureOut">
               <a:rPr lang="es-PE" smtClean="0"/>
-              <a:t>10/07/2024</a:t>
+              <a:t>17/07/2024</a:t>
             </a:fld>
             <a:endParaRPr lang="es-PE"/>
           </a:p>
@@ -3065,231 +3068,146 @@
         </p:nvSpPr>
         <p:spPr>
           <a:xfrm>
-            <a:off x="897146" y="357996"/>
-            <a:ext cx="10052649" cy="5995358"/>
+            <a:off x="661358" y="5073259"/>
+            <a:ext cx="10052649" cy="1206769"/>
           </a:xfrm>
         </p:spPr>
         <p:txBody>
           <a:bodyPr>
-            <a:noAutofit/>
+            <a:normAutofit fontScale="90000"/>
           </a:bodyPr>
           <a:lstStyle/>
           <a:p>
-            <a:pPr algn="l">
-              <a:lnSpc>
-                <a:spcPct val="100000"/>
-              </a:lnSpc>
-            </a:pPr>
-            <a:r>
-              <a:rPr lang="es-ES" sz="2400" dirty="0" smtClean="0"/>
-              <a:t>“</a:t>
-            </a:r>
-            <a:r>
-              <a:rPr lang="es-ES" sz="2400" dirty="0"/>
-              <a:t>El hombre es </a:t>
-            </a:r>
-            <a:r>
-              <a:rPr lang="es-ES" sz="2400" dirty="0">
+            <a:r>
+              <a:rPr lang="es-PE" dirty="0"/>
+              <a:t>2</a:t>
+            </a:r>
+            <a:r>
+              <a:rPr lang="es-PE" dirty="0" smtClean="0"/>
+              <a:t>. Kant y la educación</a:t>
+            </a:r>
+            <a:br>
+              <a:rPr lang="es-PE" dirty="0" smtClean="0"/>
+            </a:br>
+            <a:r>
+              <a:rPr lang="es-PE" dirty="0"/>
+              <a:t/>
+            </a:r>
+            <a:br>
+              <a:rPr lang="es-PE" dirty="0"/>
+            </a:br>
+            <a:r>
+              <a:rPr lang="es-PE" dirty="0" smtClean="0"/>
+              <a:t>2.1 Kant como educador</a:t>
+            </a:r>
+            <a:br>
+              <a:rPr lang="es-PE" dirty="0" smtClean="0"/>
+            </a:br>
+            <a:r>
+              <a:rPr lang="es-PE" dirty="0" smtClean="0"/>
+              <a:t>2.2 </a:t>
+            </a:r>
+            <a:r>
+              <a:rPr lang="es-PE" dirty="0" smtClean="0">
                 <a:solidFill>
                   <a:srgbClr val="FF0000"/>
                 </a:solidFill>
               </a:rPr>
-              <a:t>la única criatura </a:t>
-            </a:r>
-            <a:r>
-              <a:rPr lang="es-ES" sz="2400" dirty="0"/>
-              <a:t>que tiene que ser educada.” (2009; p. 27</a:t>
-            </a:r>
-            <a:r>
-              <a:rPr lang="es-ES" sz="2400" dirty="0" smtClean="0"/>
-              <a:t>)</a:t>
+              <a:t>Ideas de las “Lecciones sobre pedagogía”</a:t>
+            </a:r>
+            <a:r>
+              <a:rPr lang="es-PE" dirty="0" smtClean="0"/>
+              <a:t/>
             </a:r>
             <a:br>
-              <a:rPr lang="es-ES" sz="2400" dirty="0" smtClean="0"/>
+              <a:rPr lang="es-PE" dirty="0" smtClean="0"/>
             </a:br>
             <a:r>
-              <a:rPr lang="es-ES" sz="2400" dirty="0" smtClean="0"/>
-              <a:t>“</a:t>
-            </a:r>
-            <a:r>
-              <a:rPr lang="es-ES" sz="2400" dirty="0"/>
-              <a:t>La disciplina o la crianza </a:t>
-            </a:r>
-            <a:r>
-              <a:rPr lang="es-ES" sz="2400" dirty="0">
-                <a:solidFill>
-                  <a:srgbClr val="FF0000"/>
-                </a:solidFill>
-              </a:rPr>
-              <a:t>transforman la animalidad en humanidad</a:t>
-            </a:r>
-            <a:r>
-              <a:rPr lang="es-ES" sz="2400" dirty="0"/>
-              <a:t>.” (2009; p.28) </a:t>
-            </a:r>
-            <a:r>
-              <a:rPr lang="es-ES" sz="2400" dirty="0" smtClean="0"/>
-              <a:t/>
-            </a:r>
-            <a:br>
-              <a:rPr lang="es-ES" sz="2400" dirty="0" smtClean="0"/>
-            </a:br>
-            <a:r>
-              <a:rPr lang="es-ES" sz="2400" dirty="0"/>
-              <a:t>“Una generación educa a la otra</a:t>
-            </a:r>
-            <a:r>
-              <a:rPr lang="es-ES" sz="2400" dirty="0" smtClean="0"/>
-              <a:t>.”</a:t>
-            </a:r>
-            <a:r>
-              <a:rPr lang="es-ES" sz="2400" dirty="0"/>
-              <a:t> (2009; p. 28) </a:t>
-            </a:r>
-            <a:r>
-              <a:rPr lang="es-ES" sz="2400" dirty="0" smtClean="0"/>
-              <a:t/>
-            </a:r>
-            <a:br>
-              <a:rPr lang="es-ES" sz="2400" dirty="0" smtClean="0"/>
-            </a:br>
-            <a:r>
-              <a:rPr lang="es-ES" sz="2400" dirty="0" smtClean="0"/>
-              <a:t>“</a:t>
-            </a:r>
-            <a:r>
-              <a:rPr lang="es-ES" sz="2400" dirty="0"/>
-              <a:t>Acaso se haga la educación cada vez mejor y que cada generación sucesiva dé un paso más hacia el perfeccionamiento de la humanidad; pues </a:t>
-            </a:r>
-            <a:r>
-              <a:rPr lang="es-ES" sz="2400" dirty="0">
-                <a:solidFill>
-                  <a:srgbClr val="FF0000"/>
-                </a:solidFill>
-              </a:rPr>
-              <a:t>detrás de la educación está escondido el gran misterio de la perfección de la naturaleza humana</a:t>
-            </a:r>
-            <a:r>
-              <a:rPr lang="es-ES" sz="2400" dirty="0"/>
-              <a:t>” (2009; p.32) </a:t>
-            </a:r>
-            <a:r>
-              <a:rPr lang="es-ES" sz="2400" dirty="0" smtClean="0"/>
-              <a:t/>
-            </a:r>
-            <a:br>
-              <a:rPr lang="es-ES" sz="2400" dirty="0" smtClean="0"/>
-            </a:br>
-            <a:r>
-              <a:rPr lang="es-ES" sz="2400" dirty="0"/>
-              <a:t>“La base de un plan de educación tiene que ser hecha desde un punto de vista </a:t>
-            </a:r>
-            <a:r>
-              <a:rPr lang="es-ES" sz="2400" dirty="0">
-                <a:solidFill>
-                  <a:srgbClr val="FF0000"/>
-                </a:solidFill>
-              </a:rPr>
-              <a:t>cosmopolita</a:t>
-            </a:r>
-            <a:r>
-              <a:rPr lang="es-ES" sz="2400" dirty="0"/>
-              <a:t>.” (2009; p. 38) </a:t>
-            </a:r>
-            <a:r>
-              <a:rPr lang="es-ES" sz="2400" dirty="0" smtClean="0"/>
-              <a:t/>
-            </a:r>
-            <a:br>
-              <a:rPr lang="es-ES" sz="2400" dirty="0" smtClean="0"/>
-            </a:br>
-            <a:r>
-              <a:rPr lang="es-ES" sz="2400" dirty="0"/>
-              <a:t>“Con el adiestramiento, sin embargo, no se ha logrado el objetivo; sino que </a:t>
-            </a:r>
-            <a:r>
-              <a:rPr lang="es-ES" sz="2400" dirty="0" smtClean="0">
-                <a:solidFill>
-                  <a:srgbClr val="FF0000"/>
-                </a:solidFill>
-              </a:rPr>
-              <a:t>se trata </a:t>
-            </a:r>
-            <a:r>
-              <a:rPr lang="es-ES" sz="2400" dirty="0">
-                <a:solidFill>
-                  <a:srgbClr val="FF0000"/>
-                </a:solidFill>
-              </a:rPr>
-              <a:t>sobre todo </a:t>
-            </a:r>
-            <a:r>
-              <a:rPr lang="es-ES" sz="2400" dirty="0" smtClean="0">
-                <a:solidFill>
-                  <a:srgbClr val="FF0000"/>
-                </a:solidFill>
-              </a:rPr>
-              <a:t>de que los niños aprendan a pensar.</a:t>
-            </a:r>
-            <a:r>
-              <a:rPr lang="es-ES" sz="2400" dirty="0" smtClean="0"/>
-              <a:t>” (2009; p. 42) </a:t>
-            </a:r>
-            <a:br>
-              <a:rPr lang="es-ES" sz="2400" dirty="0" smtClean="0"/>
-            </a:br>
-            <a:r>
-              <a:rPr lang="es-ES" sz="2400" dirty="0" smtClean="0"/>
-              <a:t>“Los niños deben ser educados no de acuerdo con el estado presente del género humano, sino </a:t>
-            </a:r>
-            <a:r>
-              <a:rPr lang="es-ES" sz="2400" dirty="0" smtClean="0">
-                <a:solidFill>
-                  <a:srgbClr val="FF0000"/>
-                </a:solidFill>
-              </a:rPr>
-              <a:t>de acuerdo con el posible y mejor estado futuro, es decir: según la idea de la humanidad</a:t>
-            </a:r>
-            <a:r>
-              <a:rPr lang="es-ES" sz="2400" dirty="0" smtClean="0"/>
-              <a:t> y todo su destino. (2009; p. 38)</a:t>
-            </a:r>
-            <a:endParaRPr lang="es-PE" sz="2400" dirty="0"/>
-          </a:p>
-        </p:txBody>
-      </p:sp>
-      <p:sp>
-        <p:nvSpPr>
-          <p:cNvPr id="3" name="Rectángulo 2"/>
-          <p:cNvSpPr/>
+              <a:rPr lang="es-PE" dirty="0" smtClean="0"/>
+              <a:t>2.3 Conceptos del proyecto crítico y la filosofía política para la educación</a:t>
+            </a:r>
+            <a:endParaRPr lang="es-PE" dirty="0"/>
+          </a:p>
+        </p:txBody>
+      </p:sp>
+      <p:sp>
+        <p:nvSpPr>
+          <p:cNvPr id="3" name="CuadroTexto 2"/>
+          <p:cNvSpPr txBox="1"/>
           <p:nvPr/>
         </p:nvSpPr>
         <p:spPr>
           <a:xfrm>
-            <a:off x="3042585" y="127163"/>
-            <a:ext cx="5761770" cy="461665"/>
+            <a:off x="9324109" y="4617682"/>
+            <a:ext cx="5527964" cy="2585323"/>
           </a:xfrm>
           <a:prstGeom prst="rect">
             <a:avLst/>
           </a:prstGeom>
+          <a:noFill/>
         </p:spPr>
         <p:txBody>
-          <a:bodyPr wrap="none">
+          <a:bodyPr wrap="square" rtlCol="0">
             <a:spAutoFit/>
           </a:bodyPr>
           <a:lstStyle/>
           <a:p>
             <a:r>
-              <a:rPr lang="es-PE" sz="2400" dirty="0"/>
-              <a:t>2.2 Ideas de las “Lecciones sobre pedagogía”</a:t>
-            </a:r>
+              <a:rPr lang="es-PE" dirty="0" smtClean="0"/>
+              <a:t>Razón pública</a:t>
+            </a:r>
+          </a:p>
+          <a:p>
+            <a:r>
+              <a:rPr lang="es-PE" dirty="0" smtClean="0"/>
+              <a:t>Tolerancia</a:t>
+            </a:r>
+          </a:p>
+          <a:p>
+            <a:r>
+              <a:rPr lang="es-PE" dirty="0" smtClean="0"/>
+              <a:t>Uso no dogmático de la razón</a:t>
+            </a:r>
+          </a:p>
+          <a:p>
+            <a:r>
+              <a:rPr lang="es-PE" dirty="0" smtClean="0"/>
+              <a:t>Voluntad unificada del pueblo</a:t>
+            </a:r>
+          </a:p>
+          <a:p>
+            <a:r>
+              <a:rPr lang="es-PE" dirty="0" smtClean="0"/>
+              <a:t>Republicanismo</a:t>
+            </a:r>
+          </a:p>
+          <a:p>
+            <a:r>
+              <a:rPr lang="es-PE" dirty="0" smtClean="0"/>
+              <a:t>Paz perpetua</a:t>
+            </a:r>
+          </a:p>
+          <a:p>
+            <a:r>
+              <a:rPr lang="es-PE" dirty="0" smtClean="0"/>
+              <a:t>Cosmopolitismo</a:t>
+            </a:r>
+          </a:p>
+          <a:p>
+            <a:r>
+              <a:rPr lang="es-PE" dirty="0" smtClean="0"/>
+              <a:t>Sociedad civil</a:t>
+            </a:r>
+          </a:p>
+          <a:p>
+            <a:endParaRPr lang="es-PE" dirty="0"/>
           </a:p>
         </p:txBody>
       </p:sp>
     </p:spTree>
     <p:extLst>
       <p:ext uri="{BB962C8B-B14F-4D97-AF65-F5344CB8AC3E}">
-        <p14:creationId xmlns:p14="http://schemas.microsoft.com/office/powerpoint/2010/main" val="2088408808"/>
+        <p14:creationId xmlns:p14="http://schemas.microsoft.com/office/powerpoint/2010/main" val="1219000568"/>
       </p:ext>
     </p:extLst>
   </p:cSld>
@@ -3328,6 +3246,269 @@
         </p:nvSpPr>
         <p:spPr>
           <a:xfrm>
+            <a:off x="897146" y="357996"/>
+            <a:ext cx="10052649" cy="5995358"/>
+          </a:xfrm>
+        </p:spPr>
+        <p:txBody>
+          <a:bodyPr>
+            <a:noAutofit/>
+          </a:bodyPr>
+          <a:lstStyle/>
+          <a:p>
+            <a:pPr algn="l">
+              <a:lnSpc>
+                <a:spcPct val="100000"/>
+              </a:lnSpc>
+            </a:pPr>
+            <a:r>
+              <a:rPr lang="es-ES" sz="2400" dirty="0" smtClean="0"/>
+              <a:t>“</a:t>
+            </a:r>
+            <a:r>
+              <a:rPr lang="es-ES" sz="2400" dirty="0"/>
+              <a:t>El hombre es </a:t>
+            </a:r>
+            <a:r>
+              <a:rPr lang="es-ES" sz="2400" dirty="0">
+                <a:solidFill>
+                  <a:srgbClr val="FF0000"/>
+                </a:solidFill>
+              </a:rPr>
+              <a:t>la única criatura </a:t>
+            </a:r>
+            <a:r>
+              <a:rPr lang="es-ES" sz="2400" dirty="0"/>
+              <a:t>que tiene que ser educada.” (2009; p. 27</a:t>
+            </a:r>
+            <a:r>
+              <a:rPr lang="es-ES" sz="2400" dirty="0" smtClean="0"/>
+              <a:t>)</a:t>
+            </a:r>
+            <a:br>
+              <a:rPr lang="es-ES" sz="2400" dirty="0" smtClean="0"/>
+            </a:br>
+            <a:r>
+              <a:rPr lang="es-ES" sz="2400" dirty="0" smtClean="0"/>
+              <a:t>“</a:t>
+            </a:r>
+            <a:r>
+              <a:rPr lang="es-ES" sz="2400" dirty="0"/>
+              <a:t>La disciplina o la crianza </a:t>
+            </a:r>
+            <a:r>
+              <a:rPr lang="es-ES" sz="2400" dirty="0">
+                <a:solidFill>
+                  <a:srgbClr val="FF0000"/>
+                </a:solidFill>
+              </a:rPr>
+              <a:t>transforman la animalidad en humanidad</a:t>
+            </a:r>
+            <a:r>
+              <a:rPr lang="es-ES" sz="2400" dirty="0"/>
+              <a:t>.” (2009; p.28) </a:t>
+            </a:r>
+            <a:r>
+              <a:rPr lang="es-ES" sz="2400" dirty="0" smtClean="0"/>
+              <a:t/>
+            </a:r>
+            <a:br>
+              <a:rPr lang="es-ES" sz="2400" dirty="0" smtClean="0"/>
+            </a:br>
+            <a:r>
+              <a:rPr lang="es-ES" sz="2400" dirty="0"/>
+              <a:t>“Una generación educa a la otra</a:t>
+            </a:r>
+            <a:r>
+              <a:rPr lang="es-ES" sz="2400" dirty="0" smtClean="0"/>
+              <a:t>.”</a:t>
+            </a:r>
+            <a:r>
+              <a:rPr lang="es-ES" sz="2400" dirty="0"/>
+              <a:t> (2009; p. 28) </a:t>
+            </a:r>
+            <a:r>
+              <a:rPr lang="es-ES" sz="2400" dirty="0" smtClean="0"/>
+              <a:t/>
+            </a:r>
+            <a:br>
+              <a:rPr lang="es-ES" sz="2400" dirty="0" smtClean="0"/>
+            </a:br>
+            <a:r>
+              <a:rPr lang="es-ES" sz="2400" dirty="0" smtClean="0"/>
+              <a:t>“</a:t>
+            </a:r>
+            <a:r>
+              <a:rPr lang="es-ES" sz="2400" dirty="0"/>
+              <a:t>Acaso se haga la educación cada vez mejor y que cada generación sucesiva dé un paso más hacia el perfeccionamiento de la humanidad; pues </a:t>
+            </a:r>
+            <a:r>
+              <a:rPr lang="es-ES" sz="2400" dirty="0">
+                <a:solidFill>
+                  <a:srgbClr val="FF0000"/>
+                </a:solidFill>
+              </a:rPr>
+              <a:t>detrás de la educación está escondido el gran misterio de la perfección de la naturaleza humana</a:t>
+            </a:r>
+            <a:r>
+              <a:rPr lang="es-ES" sz="2400" dirty="0"/>
+              <a:t>” (2009; p.32) </a:t>
+            </a:r>
+            <a:r>
+              <a:rPr lang="es-ES" sz="2400" dirty="0" smtClean="0"/>
+              <a:t/>
+            </a:r>
+            <a:br>
+              <a:rPr lang="es-ES" sz="2400" dirty="0" smtClean="0"/>
+            </a:br>
+            <a:r>
+              <a:rPr lang="es-ES" sz="2400" dirty="0"/>
+              <a:t>“La base de un plan de educación tiene que ser hecha desde un punto de vista </a:t>
+            </a:r>
+            <a:r>
+              <a:rPr lang="es-ES" sz="2400" dirty="0">
+                <a:solidFill>
+                  <a:srgbClr val="FF0000"/>
+                </a:solidFill>
+              </a:rPr>
+              <a:t>cosmopolita</a:t>
+            </a:r>
+            <a:r>
+              <a:rPr lang="es-ES" sz="2400" dirty="0"/>
+              <a:t>.” (2009; p. 38) </a:t>
+            </a:r>
+            <a:r>
+              <a:rPr lang="es-ES" sz="2400" dirty="0" smtClean="0"/>
+              <a:t/>
+            </a:r>
+            <a:br>
+              <a:rPr lang="es-ES" sz="2400" dirty="0" smtClean="0"/>
+            </a:br>
+            <a:r>
+              <a:rPr lang="es-ES" sz="2400" dirty="0"/>
+              <a:t>“Con el adiestramiento, sin embargo, no se ha logrado el objetivo; sino que </a:t>
+            </a:r>
+            <a:r>
+              <a:rPr lang="es-ES" sz="2400" dirty="0" smtClean="0">
+                <a:solidFill>
+                  <a:srgbClr val="FF0000"/>
+                </a:solidFill>
+              </a:rPr>
+              <a:t>se trata </a:t>
+            </a:r>
+            <a:r>
+              <a:rPr lang="es-ES" sz="2400" dirty="0">
+                <a:solidFill>
+                  <a:srgbClr val="FF0000"/>
+                </a:solidFill>
+              </a:rPr>
+              <a:t>sobre todo </a:t>
+            </a:r>
+            <a:r>
+              <a:rPr lang="es-ES" sz="2400" dirty="0" smtClean="0">
+                <a:solidFill>
+                  <a:srgbClr val="FF0000"/>
+                </a:solidFill>
+              </a:rPr>
+              <a:t>de que los niños aprendan a pensar.</a:t>
+            </a:r>
+            <a:r>
+              <a:rPr lang="es-ES" sz="2400" dirty="0" smtClean="0"/>
+              <a:t>” (2009; p. 42) </a:t>
+            </a:r>
+            <a:br>
+              <a:rPr lang="es-ES" sz="2400" dirty="0" smtClean="0"/>
+            </a:br>
+            <a:r>
+              <a:rPr lang="es-ES" sz="2400" dirty="0" smtClean="0"/>
+              <a:t>“Los niños deben ser educados no de acuerdo con el estado presente del género humano, sino </a:t>
+            </a:r>
+            <a:r>
+              <a:rPr lang="es-ES" sz="2400" dirty="0" smtClean="0">
+                <a:solidFill>
+                  <a:srgbClr val="FF0000"/>
+                </a:solidFill>
+              </a:rPr>
+              <a:t>de acuerdo con el posible y mejor estado futuro, es decir: según la idea de la humanidad</a:t>
+            </a:r>
+            <a:r>
+              <a:rPr lang="es-ES" sz="2400" dirty="0" smtClean="0"/>
+              <a:t> y todo su destino. (2009; p. 38)</a:t>
+            </a:r>
+            <a:endParaRPr lang="es-PE" sz="2400" dirty="0"/>
+          </a:p>
+        </p:txBody>
+      </p:sp>
+      <p:sp>
+        <p:nvSpPr>
+          <p:cNvPr id="3" name="Rectángulo 2"/>
+          <p:cNvSpPr/>
+          <p:nvPr/>
+        </p:nvSpPr>
+        <p:spPr>
+          <a:xfrm>
+            <a:off x="3042585" y="127163"/>
+            <a:ext cx="5761770" cy="461665"/>
+          </a:xfrm>
+          <a:prstGeom prst="rect">
+            <a:avLst/>
+          </a:prstGeom>
+        </p:spPr>
+        <p:txBody>
+          <a:bodyPr wrap="none">
+            <a:spAutoFit/>
+          </a:bodyPr>
+          <a:lstStyle/>
+          <a:p>
+            <a:r>
+              <a:rPr lang="es-PE" sz="2400" dirty="0"/>
+              <a:t>2.2 Ideas de las “Lecciones sobre pedagogía”</a:t>
+            </a:r>
+          </a:p>
+        </p:txBody>
+      </p:sp>
+    </p:spTree>
+    <p:extLst>
+      <p:ext uri="{BB962C8B-B14F-4D97-AF65-F5344CB8AC3E}">
+        <p14:creationId xmlns:p14="http://schemas.microsoft.com/office/powerpoint/2010/main" val="2088408808"/>
+      </p:ext>
+    </p:extLst>
+  </p:cSld>
+  <p:clrMapOvr>
+    <a:masterClrMapping/>
+  </p:clrMapOvr>
+</p:sld>
+</file>
+
+<file path=ppt/slides/slide12.xml><?xml version="1.0" encoding="utf-8"?>
+<p:sld xmlns:a="http://schemas.openxmlformats.org/drawingml/2006/main" xmlns:r="http://schemas.openxmlformats.org/officeDocument/2006/relationships" xmlns:p="http://schemas.openxmlformats.org/presentationml/2006/main">
+  <p:cSld>
+    <p:spTree>
+      <p:nvGrpSpPr>
+        <p:cNvPr id="1" name=""/>
+        <p:cNvGrpSpPr/>
+        <p:nvPr/>
+      </p:nvGrpSpPr>
+      <p:grpSpPr>
+        <a:xfrm>
+          <a:off x="0" y="0"/>
+          <a:ext cx="0" cy="0"/>
+          <a:chOff x="0" y="0"/>
+          <a:chExt cx="0" cy="0"/>
+        </a:xfrm>
+      </p:grpSpPr>
+      <p:sp>
+        <p:nvSpPr>
+          <p:cNvPr id="2" name="Título 1"/>
+          <p:cNvSpPr>
+            <a:spLocks noGrp="1"/>
+          </p:cNvSpPr>
+          <p:nvPr>
+            <p:ph type="ctrTitle"/>
+          </p:nvPr>
+        </p:nvSpPr>
+        <p:spPr>
+          <a:xfrm>
             <a:off x="1092678" y="345984"/>
             <a:ext cx="10052649" cy="1206769"/>
           </a:xfrm>
@@ -3340,19 +3521,7 @@
           <a:p>
             <a:r>
               <a:rPr lang="es-PE" sz="4400" dirty="0" smtClean="0"/>
-              <a:t>3. </a:t>
-            </a:r>
-            <a:r>
-              <a:rPr lang="es-PE" sz="4400" dirty="0" smtClean="0"/>
-              <a:t>Conclusiones: La </a:t>
-            </a:r>
-            <a:r>
-              <a:rPr lang="es-PE" sz="4400" dirty="0" smtClean="0"/>
-              <a:t>educación como asunto político en el pensamiento de </a:t>
-            </a:r>
-            <a:r>
-              <a:rPr lang="es-PE" sz="4400" dirty="0" smtClean="0"/>
-              <a:t>Kant</a:t>
+              <a:t>3. Conclusiones: La educación como asunto político en el pensamiento de Kant</a:t>
             </a:r>
             <a:endParaRPr lang="es-PE" sz="4400" dirty="0"/>
           </a:p>
@@ -3640,6 +3809,987 @@
     <p:extLst>
       <p:ext uri="{BB962C8B-B14F-4D97-AF65-F5344CB8AC3E}">
         <p14:creationId xmlns:p14="http://schemas.microsoft.com/office/powerpoint/2010/main" val="4109668490"/>
+      </p:ext>
+    </p:extLst>
+  </p:cSld>
+  <p:clrMapOvr>
+    <a:masterClrMapping/>
+  </p:clrMapOvr>
+</p:sld>
+</file>
+
+<file path=ppt/slides/slide13.xml><?xml version="1.0" encoding="utf-8"?>
+<p:sld xmlns:a="http://schemas.openxmlformats.org/drawingml/2006/main" xmlns:r="http://schemas.openxmlformats.org/officeDocument/2006/relationships" xmlns:p="http://schemas.openxmlformats.org/presentationml/2006/main">
+  <p:cSld>
+    <p:spTree>
+      <p:nvGrpSpPr>
+        <p:cNvPr id="1" name=""/>
+        <p:cNvGrpSpPr/>
+        <p:nvPr/>
+      </p:nvGrpSpPr>
+      <p:grpSpPr>
+        <a:xfrm>
+          <a:off x="0" y="0"/>
+          <a:ext cx="0" cy="0"/>
+          <a:chOff x="0" y="0"/>
+          <a:chExt cx="0" cy="0"/>
+        </a:xfrm>
+      </p:grpSpPr>
+      <p:sp>
+        <p:nvSpPr>
+          <p:cNvPr id="2" name="Título 1"/>
+          <p:cNvSpPr>
+            <a:spLocks noGrp="1"/>
+          </p:cNvSpPr>
+          <p:nvPr>
+            <p:ph type="title"/>
+          </p:nvPr>
+        </p:nvSpPr>
+        <p:spPr>
+          <a:xfrm>
+            <a:off x="838200" y="365125"/>
+            <a:ext cx="3206858" cy="1325563"/>
+          </a:xfrm>
+        </p:spPr>
+        <p:txBody>
+          <a:bodyPr/>
+          <a:lstStyle/>
+          <a:p>
+            <a:r>
+              <a:rPr lang="es-PE" dirty="0" smtClean="0"/>
+              <a:t>Problemas</a:t>
+            </a:r>
+            <a:endParaRPr lang="es-PE" dirty="0"/>
+          </a:p>
+        </p:txBody>
+      </p:sp>
+      <p:sp>
+        <p:nvSpPr>
+          <p:cNvPr id="3" name="Marcador de contenido 2"/>
+          <p:cNvSpPr>
+            <a:spLocks noGrp="1"/>
+          </p:cNvSpPr>
+          <p:nvPr>
+            <p:ph idx="1"/>
+          </p:nvPr>
+        </p:nvSpPr>
+        <p:spPr>
+          <a:xfrm>
+            <a:off x="667719" y="1825625"/>
+            <a:ext cx="4586207" cy="4351338"/>
+          </a:xfrm>
+        </p:spPr>
+        <p:txBody>
+          <a:bodyPr>
+            <a:normAutofit fontScale="77500" lnSpcReduction="20000"/>
+          </a:bodyPr>
+          <a:lstStyle/>
+          <a:p>
+            <a:r>
+              <a:rPr lang="es-PE" dirty="0" smtClean="0"/>
+              <a:t>La educación como tema no tiene un tratado sistemático crítico.</a:t>
+            </a:r>
+          </a:p>
+          <a:p>
+            <a:r>
+              <a:rPr lang="es-PE" dirty="0" smtClean="0"/>
+              <a:t>La educación puede haber no sido un tema tan importante para Kant.</a:t>
+            </a:r>
+          </a:p>
+          <a:p>
+            <a:r>
+              <a:rPr lang="es-PE" dirty="0" smtClean="0"/>
+              <a:t>Kant, siendo sistemático, dificulta la articulación de pensadores de otras corrientes. </a:t>
+            </a:r>
+          </a:p>
+          <a:p>
+            <a:r>
+              <a:rPr lang="es-PE" dirty="0" smtClean="0"/>
+              <a:t>Son demasiados ámbitos los que habría que considerar para estudiar la educación en Kant.</a:t>
+            </a:r>
+          </a:p>
+          <a:p>
+            <a:r>
+              <a:rPr lang="es-PE" dirty="0" smtClean="0"/>
+              <a:t>Hace falta entender bien el proyecto crítico de Kant para investigar cualquier tema en el sistema de su pensamiento.</a:t>
+            </a:r>
+            <a:endParaRPr lang="es-PE" dirty="0"/>
+          </a:p>
+        </p:txBody>
+      </p:sp>
+      <p:sp>
+        <p:nvSpPr>
+          <p:cNvPr id="4" name="Título 1"/>
+          <p:cNvSpPr txBox="1">
+            <a:spLocks/>
+          </p:cNvSpPr>
+          <p:nvPr/>
+        </p:nvSpPr>
+        <p:spPr>
+          <a:xfrm>
+            <a:off x="7639372" y="265301"/>
+            <a:ext cx="3206858" cy="1325563"/>
+          </a:xfrm>
+          <a:prstGeom prst="rect">
+            <a:avLst/>
+          </a:prstGeom>
+        </p:spPr>
+        <p:txBody>
+          <a:bodyPr vert="horz" lIns="91440" tIns="45720" rIns="91440" bIns="45720" rtlCol="0" anchor="ctr">
+            <a:normAutofit/>
+          </a:bodyPr>
+          <a:lstStyle>
+            <a:lvl1pPr algn="l" defTabSz="914400" rtl="0" eaLnBrk="1" latinLnBrk="0" hangingPunct="1">
+              <a:lnSpc>
+                <a:spcPct val="90000"/>
+              </a:lnSpc>
+              <a:spcBef>
+                <a:spcPct val="0"/>
+              </a:spcBef>
+              <a:buNone/>
+              <a:defRPr sz="4400" kern="1200">
+                <a:solidFill>
+                  <a:schemeClr val="tx1"/>
+                </a:solidFill>
+                <a:latin typeface="+mj-lt"/>
+                <a:ea typeface="+mj-ea"/>
+                <a:cs typeface="+mj-cs"/>
+              </a:defRPr>
+            </a:lvl1pPr>
+          </a:lstStyle>
+          <a:p>
+            <a:r>
+              <a:rPr lang="es-PE" dirty="0" smtClean="0"/>
+              <a:t>Desarrollo</a:t>
+            </a:r>
+          </a:p>
+        </p:txBody>
+      </p:sp>
+      <p:sp>
+        <p:nvSpPr>
+          <p:cNvPr id="5" name="Marcador de contenido 2"/>
+          <p:cNvSpPr txBox="1">
+            <a:spLocks/>
+          </p:cNvSpPr>
+          <p:nvPr/>
+        </p:nvSpPr>
+        <p:spPr>
+          <a:xfrm>
+            <a:off x="6949697" y="1825625"/>
+            <a:ext cx="4586207" cy="4351338"/>
+          </a:xfrm>
+          <a:prstGeom prst="rect">
+            <a:avLst/>
+          </a:prstGeom>
+        </p:spPr>
+        <p:txBody>
+          <a:bodyPr vert="horz" lIns="91440" tIns="45720" rIns="91440" bIns="45720" rtlCol="0">
+            <a:normAutofit/>
+          </a:bodyPr>
+          <a:lstStyle>
+            <a:lvl1pPr marL="228600" indent="-228600" algn="l" defTabSz="914400" rtl="0" eaLnBrk="1" latinLnBrk="0" hangingPunct="1">
+              <a:lnSpc>
+                <a:spcPct val="90000"/>
+              </a:lnSpc>
+              <a:spcBef>
+                <a:spcPts val="1000"/>
+              </a:spcBef>
+              <a:buFont typeface="Arial" panose="020B0604020202020204" pitchFamily="34" charset="0"/>
+              <a:buChar char="•"/>
+              <a:defRPr sz="2800" kern="1200">
+                <a:solidFill>
+                  <a:schemeClr val="tx1"/>
+                </a:solidFill>
+                <a:latin typeface="+mn-lt"/>
+                <a:ea typeface="+mn-ea"/>
+                <a:cs typeface="+mn-cs"/>
+              </a:defRPr>
+            </a:lvl1pPr>
+            <a:lvl2pPr marL="685800" indent="-228600" algn="l" defTabSz="914400" rtl="0" eaLnBrk="1" latinLnBrk="0" hangingPunct="1">
+              <a:lnSpc>
+                <a:spcPct val="90000"/>
+              </a:lnSpc>
+              <a:spcBef>
+                <a:spcPts val="500"/>
+              </a:spcBef>
+              <a:buFont typeface="Arial" panose="020B0604020202020204" pitchFamily="34" charset="0"/>
+              <a:buChar char="•"/>
+              <a:defRPr sz="2400" kern="1200">
+                <a:solidFill>
+                  <a:schemeClr val="tx1"/>
+                </a:solidFill>
+                <a:latin typeface="+mn-lt"/>
+                <a:ea typeface="+mn-ea"/>
+                <a:cs typeface="+mn-cs"/>
+              </a:defRPr>
+            </a:lvl2pPr>
+            <a:lvl3pPr marL="1143000" indent="-228600" algn="l" defTabSz="914400" rtl="0" eaLnBrk="1" latinLnBrk="0" hangingPunct="1">
+              <a:lnSpc>
+                <a:spcPct val="90000"/>
+              </a:lnSpc>
+              <a:spcBef>
+                <a:spcPts val="500"/>
+              </a:spcBef>
+              <a:buFont typeface="Arial" panose="020B0604020202020204" pitchFamily="34" charset="0"/>
+              <a:buChar char="•"/>
+              <a:defRPr sz="2000" kern="1200">
+                <a:solidFill>
+                  <a:schemeClr val="tx1"/>
+                </a:solidFill>
+                <a:latin typeface="+mn-lt"/>
+                <a:ea typeface="+mn-ea"/>
+                <a:cs typeface="+mn-cs"/>
+              </a:defRPr>
+            </a:lvl3pPr>
+            <a:lvl4pPr marL="1600200" indent="-228600" algn="l" defTabSz="914400" rtl="0" eaLnBrk="1" latinLnBrk="0" hangingPunct="1">
+              <a:lnSpc>
+                <a:spcPct val="90000"/>
+              </a:lnSpc>
+              <a:spcBef>
+                <a:spcPts val="500"/>
+              </a:spcBef>
+              <a:buFont typeface="Arial" panose="020B0604020202020204" pitchFamily="34" charset="0"/>
+              <a:buChar char="•"/>
+              <a:defRPr sz="1800" kern="1200">
+                <a:solidFill>
+                  <a:schemeClr val="tx1"/>
+                </a:solidFill>
+                <a:latin typeface="+mn-lt"/>
+                <a:ea typeface="+mn-ea"/>
+                <a:cs typeface="+mn-cs"/>
+              </a:defRPr>
+            </a:lvl4pPr>
+            <a:lvl5pPr marL="2057400" indent="-228600" algn="l" defTabSz="914400" rtl="0" eaLnBrk="1" latinLnBrk="0" hangingPunct="1">
+              <a:lnSpc>
+                <a:spcPct val="90000"/>
+              </a:lnSpc>
+              <a:spcBef>
+                <a:spcPts val="500"/>
+              </a:spcBef>
+              <a:buFont typeface="Arial" panose="020B0604020202020204" pitchFamily="34" charset="0"/>
+              <a:buChar char="•"/>
+              <a:defRPr sz="1800" kern="1200">
+                <a:solidFill>
+                  <a:schemeClr val="tx1"/>
+                </a:solidFill>
+                <a:latin typeface="+mn-lt"/>
+                <a:ea typeface="+mn-ea"/>
+                <a:cs typeface="+mn-cs"/>
+              </a:defRPr>
+            </a:lvl5pPr>
+            <a:lvl6pPr marL="2514600" indent="-228600" algn="l" defTabSz="914400" rtl="0" eaLnBrk="1" latinLnBrk="0" hangingPunct="1">
+              <a:lnSpc>
+                <a:spcPct val="90000"/>
+              </a:lnSpc>
+              <a:spcBef>
+                <a:spcPts val="500"/>
+              </a:spcBef>
+              <a:buFont typeface="Arial" panose="020B0604020202020204" pitchFamily="34" charset="0"/>
+              <a:buChar char="•"/>
+              <a:defRPr sz="1800" kern="1200">
+                <a:solidFill>
+                  <a:schemeClr val="tx1"/>
+                </a:solidFill>
+                <a:latin typeface="+mn-lt"/>
+                <a:ea typeface="+mn-ea"/>
+                <a:cs typeface="+mn-cs"/>
+              </a:defRPr>
+            </a:lvl6pPr>
+            <a:lvl7pPr marL="2971800" indent="-228600" algn="l" defTabSz="914400" rtl="0" eaLnBrk="1" latinLnBrk="0" hangingPunct="1">
+              <a:lnSpc>
+                <a:spcPct val="90000"/>
+              </a:lnSpc>
+              <a:spcBef>
+                <a:spcPts val="500"/>
+              </a:spcBef>
+              <a:buFont typeface="Arial" panose="020B0604020202020204" pitchFamily="34" charset="0"/>
+              <a:buChar char="•"/>
+              <a:defRPr sz="1800" kern="1200">
+                <a:solidFill>
+                  <a:schemeClr val="tx1"/>
+                </a:solidFill>
+                <a:latin typeface="+mn-lt"/>
+                <a:ea typeface="+mn-ea"/>
+                <a:cs typeface="+mn-cs"/>
+              </a:defRPr>
+            </a:lvl7pPr>
+            <a:lvl8pPr marL="3429000" indent="-228600" algn="l" defTabSz="914400" rtl="0" eaLnBrk="1" latinLnBrk="0" hangingPunct="1">
+              <a:lnSpc>
+                <a:spcPct val="90000"/>
+              </a:lnSpc>
+              <a:spcBef>
+                <a:spcPts val="500"/>
+              </a:spcBef>
+              <a:buFont typeface="Arial" panose="020B0604020202020204" pitchFamily="34" charset="0"/>
+              <a:buChar char="•"/>
+              <a:defRPr sz="1800" kern="1200">
+                <a:solidFill>
+                  <a:schemeClr val="tx1"/>
+                </a:solidFill>
+                <a:latin typeface="+mn-lt"/>
+                <a:ea typeface="+mn-ea"/>
+                <a:cs typeface="+mn-cs"/>
+              </a:defRPr>
+            </a:lvl8pPr>
+            <a:lvl9pPr marL="3886200" indent="-228600" algn="l" defTabSz="914400" rtl="0" eaLnBrk="1" latinLnBrk="0" hangingPunct="1">
+              <a:lnSpc>
+                <a:spcPct val="90000"/>
+              </a:lnSpc>
+              <a:spcBef>
+                <a:spcPts val="500"/>
+              </a:spcBef>
+              <a:buFont typeface="Arial" panose="020B0604020202020204" pitchFamily="34" charset="0"/>
+              <a:buChar char="•"/>
+              <a:defRPr sz="1800" kern="1200">
+                <a:solidFill>
+                  <a:schemeClr val="tx1"/>
+                </a:solidFill>
+                <a:latin typeface="+mn-lt"/>
+                <a:ea typeface="+mn-ea"/>
+                <a:cs typeface="+mn-cs"/>
+              </a:defRPr>
+            </a:lvl9pPr>
+          </a:lstStyle>
+          <a:p>
+            <a:r>
+              <a:rPr lang="es-PE" dirty="0" smtClean="0"/>
+              <a:t>Introducción          p.1</a:t>
+            </a:r>
+          </a:p>
+          <a:p>
+            <a:r>
+              <a:rPr lang="es-PE" dirty="0" smtClean="0"/>
+              <a:t>Capítulo 1               p.5</a:t>
+            </a:r>
+          </a:p>
+          <a:p>
+            <a:r>
+              <a:rPr lang="es-PE" dirty="0"/>
+              <a:t>Capítulo </a:t>
+            </a:r>
+            <a:r>
+              <a:rPr lang="es-PE" dirty="0" smtClean="0"/>
+              <a:t>2               p.50</a:t>
+            </a:r>
+            <a:endParaRPr lang="es-PE" dirty="0"/>
+          </a:p>
+          <a:p>
+            <a:r>
+              <a:rPr lang="es-PE" dirty="0"/>
+              <a:t>Capítulo </a:t>
+            </a:r>
+            <a:r>
+              <a:rPr lang="es-PE" dirty="0" smtClean="0"/>
+              <a:t>3               p.88</a:t>
+            </a:r>
+            <a:endParaRPr lang="es-PE" dirty="0"/>
+          </a:p>
+          <a:p>
+            <a:r>
+              <a:rPr lang="es-PE" dirty="0" smtClean="0"/>
+              <a:t>Conclusiones         -</a:t>
+            </a:r>
+            <a:endParaRPr lang="es-PE" dirty="0"/>
+          </a:p>
+        </p:txBody>
+      </p:sp>
+    </p:spTree>
+    <p:extLst>
+      <p:ext uri="{BB962C8B-B14F-4D97-AF65-F5344CB8AC3E}">
+        <p14:creationId xmlns:p14="http://schemas.microsoft.com/office/powerpoint/2010/main" val="157189147"/>
+      </p:ext>
+    </p:extLst>
+  </p:cSld>
+  <p:clrMapOvr>
+    <a:masterClrMapping/>
+  </p:clrMapOvr>
+</p:sld>
+</file>
+
+<file path=ppt/slides/slide14.xml><?xml version="1.0" encoding="utf-8"?>
+<p:sld xmlns:a="http://schemas.openxmlformats.org/drawingml/2006/main" xmlns:r="http://schemas.openxmlformats.org/officeDocument/2006/relationships" xmlns:p="http://schemas.openxmlformats.org/presentationml/2006/main">
+  <p:cSld>
+    <p:spTree>
+      <p:nvGrpSpPr>
+        <p:cNvPr id="1" name=""/>
+        <p:cNvGrpSpPr/>
+        <p:nvPr/>
+      </p:nvGrpSpPr>
+      <p:grpSpPr>
+        <a:xfrm>
+          <a:off x="0" y="0"/>
+          <a:ext cx="0" cy="0"/>
+          <a:chOff x="0" y="0"/>
+          <a:chExt cx="0" cy="0"/>
+        </a:xfrm>
+      </p:grpSpPr>
+      <p:sp>
+        <p:nvSpPr>
+          <p:cNvPr id="2" name="Título 1"/>
+          <p:cNvSpPr>
+            <a:spLocks noGrp="1"/>
+          </p:cNvSpPr>
+          <p:nvPr>
+            <p:ph type="title"/>
+          </p:nvPr>
+        </p:nvSpPr>
+        <p:spPr>
+          <a:xfrm>
+            <a:off x="667719" y="131208"/>
+            <a:ext cx="4286693" cy="49545"/>
+          </a:xfrm>
+        </p:spPr>
+        <p:txBody>
+          <a:bodyPr>
+            <a:noAutofit/>
+          </a:bodyPr>
+          <a:lstStyle/>
+          <a:p>
+            <a:r>
+              <a:rPr lang="es-PE" sz="2000" dirty="0" smtClean="0"/>
+              <a:t>Bibliografía</a:t>
+            </a:r>
+            <a:endParaRPr lang="es-PE" sz="2000" dirty="0"/>
+          </a:p>
+        </p:txBody>
+      </p:sp>
+      <p:sp>
+        <p:nvSpPr>
+          <p:cNvPr id="3" name="Marcador de contenido 2"/>
+          <p:cNvSpPr>
+            <a:spLocks noGrp="1"/>
+          </p:cNvSpPr>
+          <p:nvPr>
+            <p:ph idx="1"/>
+          </p:nvPr>
+        </p:nvSpPr>
+        <p:spPr>
+          <a:xfrm>
+            <a:off x="667719" y="613514"/>
+            <a:ext cx="11304541" cy="4351338"/>
+          </a:xfrm>
+        </p:spPr>
+        <p:txBody>
+          <a:bodyPr>
+            <a:noAutofit/>
+          </a:bodyPr>
+          <a:lstStyle/>
+          <a:p>
+            <a:r>
+              <a:rPr lang="en-US" sz="800" dirty="0" smtClean="0"/>
+              <a:t>Kant</a:t>
+            </a:r>
+            <a:r>
+              <a:rPr lang="en-US" sz="800" dirty="0"/>
+              <a:t>, I (1998) </a:t>
+            </a:r>
+            <a:r>
+              <a:rPr lang="en-US" sz="800" i="1" dirty="0"/>
+              <a:t>On the miscarriage of al philosophical trials in theodicy.</a:t>
+            </a:r>
+            <a:r>
+              <a:rPr lang="en-US" sz="800" dirty="0"/>
+              <a:t> </a:t>
+            </a:r>
+            <a:r>
+              <a:rPr lang="en-US" sz="800" dirty="0" err="1"/>
+              <a:t>En</a:t>
+            </a:r>
+            <a:r>
+              <a:rPr lang="en-US" sz="800" dirty="0"/>
+              <a:t>: Kant, I. Religion within the Boundaries of mere Reason</a:t>
+            </a:r>
+            <a:r>
+              <a:rPr lang="en-US" sz="800" i="1" dirty="0"/>
+              <a:t>. </a:t>
+            </a:r>
+            <a:r>
+              <a:rPr lang="en-US" sz="800" dirty="0"/>
+              <a:t>Cambridge University Press.</a:t>
+            </a:r>
+            <a:endParaRPr lang="es-PE" sz="800" dirty="0"/>
+          </a:p>
+          <a:p>
+            <a:r>
+              <a:rPr lang="en-US" sz="800" dirty="0"/>
+              <a:t>Kant, I (1998) </a:t>
+            </a:r>
+            <a:r>
+              <a:rPr lang="en-US" sz="800" i="1" dirty="0"/>
+              <a:t>Religion within the Boundaries of mere Reason. </a:t>
+            </a:r>
+            <a:r>
+              <a:rPr lang="en-US" sz="800" dirty="0"/>
+              <a:t>Cambridge University Press.</a:t>
+            </a:r>
+            <a:endParaRPr lang="es-PE" sz="800" dirty="0"/>
+          </a:p>
+          <a:p>
+            <a:r>
+              <a:rPr lang="en-US" sz="800" dirty="0"/>
+              <a:t>Kant, I (2007) </a:t>
+            </a:r>
+            <a:r>
+              <a:rPr lang="en-US" sz="800" i="1" dirty="0"/>
+              <a:t>Anthropology from a pragmatic point of view (1798)</a:t>
+            </a:r>
+            <a:r>
+              <a:rPr lang="en-US" sz="800" dirty="0"/>
+              <a:t> </a:t>
+            </a:r>
+            <a:r>
+              <a:rPr lang="en-US" sz="800" dirty="0" err="1"/>
+              <a:t>En</a:t>
+            </a:r>
+            <a:r>
+              <a:rPr lang="en-US" sz="800" dirty="0"/>
+              <a:t>: Kant, I. Anthropology, History and Education. Cambridge University Press.</a:t>
+            </a:r>
+            <a:endParaRPr lang="es-PE" sz="800" dirty="0"/>
+          </a:p>
+          <a:p>
+            <a:r>
+              <a:rPr lang="en-US" sz="800" dirty="0"/>
+              <a:t>Kant, I (2007) </a:t>
+            </a:r>
+            <a:r>
+              <a:rPr lang="en-US" sz="800" i="1" dirty="0"/>
+              <a:t>Anthropology, History and Education</a:t>
+            </a:r>
+            <a:r>
+              <a:rPr lang="en-US" sz="800" dirty="0"/>
+              <a:t>. Cambridge University Press.</a:t>
+            </a:r>
+            <a:endParaRPr lang="es-PE" sz="800" dirty="0"/>
+          </a:p>
+          <a:p>
+            <a:r>
+              <a:rPr lang="es-PE" sz="800" dirty="0"/>
+              <a:t>Kant, I (2007) </a:t>
+            </a:r>
+            <a:r>
+              <a:rPr lang="es-PE" sz="800" i="1" dirty="0"/>
+              <a:t>Crítica de la razón pura</a:t>
+            </a:r>
+            <a:r>
+              <a:rPr lang="es-PE" sz="800" dirty="0"/>
+              <a:t>. Traducción de Mario </a:t>
+            </a:r>
+            <a:r>
+              <a:rPr lang="es-PE" sz="800" dirty="0" err="1"/>
+              <a:t>Caimi</a:t>
+            </a:r>
+            <a:r>
+              <a:rPr lang="es-PE" sz="800" dirty="0"/>
+              <a:t>. Ed. </a:t>
+            </a:r>
+            <a:r>
+              <a:rPr lang="es-PE" sz="800" dirty="0" err="1"/>
+              <a:t>Colihue</a:t>
+            </a:r>
+            <a:r>
+              <a:rPr lang="es-PE" sz="800" dirty="0"/>
+              <a:t> Clásica.</a:t>
+            </a:r>
+          </a:p>
+          <a:p>
+            <a:r>
+              <a:rPr lang="en-US" sz="800" dirty="0"/>
+              <a:t>Kant, I (2007) </a:t>
+            </a:r>
+            <a:r>
+              <a:rPr lang="en-US" sz="800" i="1" dirty="0"/>
+              <a:t>Essay on the maladies of the head (1764)</a:t>
+            </a:r>
+            <a:r>
+              <a:rPr lang="en-US" sz="800" dirty="0"/>
+              <a:t> </a:t>
+            </a:r>
+            <a:r>
+              <a:rPr lang="en-US" sz="800" dirty="0" err="1"/>
+              <a:t>En</a:t>
+            </a:r>
+            <a:r>
+              <a:rPr lang="en-US" sz="800" dirty="0"/>
+              <a:t>: Kant, I. Anthropology, History and Education. Cambridge University Press.</a:t>
+            </a:r>
+            <a:endParaRPr lang="es-PE" sz="800" dirty="0"/>
+          </a:p>
+          <a:p>
+            <a:r>
+              <a:rPr lang="en-US" sz="800" dirty="0"/>
+              <a:t>Kant, I (2007) </a:t>
+            </a:r>
+            <a:r>
+              <a:rPr lang="en-US" sz="800" i="1" dirty="0"/>
+              <a:t>Essays regarding the </a:t>
+            </a:r>
+            <a:r>
+              <a:rPr lang="en-US" sz="800" i="1" dirty="0" err="1"/>
+              <a:t>Philantropinum</a:t>
+            </a:r>
+            <a:r>
+              <a:rPr lang="en-US" sz="800" i="1" dirty="0"/>
+              <a:t> (1776/1777)</a:t>
+            </a:r>
+            <a:r>
+              <a:rPr lang="en-US" sz="800" dirty="0"/>
+              <a:t> </a:t>
+            </a:r>
+            <a:r>
+              <a:rPr lang="en-US" sz="800" dirty="0" err="1"/>
+              <a:t>En</a:t>
+            </a:r>
+            <a:r>
+              <a:rPr lang="en-US" sz="800" dirty="0"/>
+              <a:t>: Kant, I. Anthropology, History and Education. Cambridge University Press.</a:t>
+            </a:r>
+            <a:endParaRPr lang="es-PE" sz="800" dirty="0"/>
+          </a:p>
+          <a:p>
+            <a:r>
+              <a:rPr lang="en-US" sz="800" dirty="0"/>
+              <a:t>Kant, I (2007) </a:t>
+            </a:r>
+            <a:r>
+              <a:rPr lang="en-US" sz="800" i="1" dirty="0"/>
+              <a:t>Lectures on pedagogy (1803)</a:t>
+            </a:r>
+            <a:r>
+              <a:rPr lang="en-US" sz="800" dirty="0"/>
+              <a:t> </a:t>
+            </a:r>
+            <a:r>
+              <a:rPr lang="en-US" sz="800" dirty="0" err="1"/>
+              <a:t>En</a:t>
+            </a:r>
+            <a:r>
+              <a:rPr lang="en-US" sz="800" dirty="0"/>
+              <a:t>: Kant, I. Anthropology, History and Education. </a:t>
+            </a:r>
+            <a:r>
+              <a:rPr lang="es-PE" sz="800" dirty="0"/>
+              <a:t>Cambridge </a:t>
+            </a:r>
+            <a:r>
+              <a:rPr lang="es-PE" sz="800" dirty="0" err="1"/>
+              <a:t>University</a:t>
+            </a:r>
+            <a:r>
+              <a:rPr lang="es-PE" sz="800" dirty="0"/>
+              <a:t> </a:t>
+            </a:r>
+            <a:r>
+              <a:rPr lang="es-PE" sz="800" dirty="0" err="1"/>
+              <a:t>Press</a:t>
+            </a:r>
+            <a:r>
+              <a:rPr lang="es-PE" sz="800" dirty="0"/>
+              <a:t>.</a:t>
+            </a:r>
+          </a:p>
+          <a:p>
+            <a:r>
+              <a:rPr lang="es-ES" sz="800" dirty="0"/>
+              <a:t>Kant, I. (1964) </a:t>
+            </a:r>
+            <a:r>
+              <a:rPr lang="es-ES" sz="800" i="1" dirty="0"/>
+              <a:t>Acerca de la relación entre la teoría y la práctica en el derecho político</a:t>
+            </a:r>
+            <a:r>
+              <a:rPr lang="es-ES" sz="800" dirty="0"/>
+              <a:t>. </a:t>
+            </a:r>
+            <a:r>
+              <a:rPr lang="es-ES" sz="800" i="1" dirty="0"/>
+              <a:t>(Contra Hobbes)</a:t>
+            </a:r>
+            <a:r>
+              <a:rPr lang="es-ES" sz="800" dirty="0"/>
+              <a:t> (En: Kant, I. Filosofía de la historia. Ed. Nova).</a:t>
+            </a:r>
+            <a:endParaRPr lang="es-PE" sz="800" dirty="0"/>
+          </a:p>
+          <a:p>
+            <a:r>
+              <a:rPr lang="es-ES" sz="800" dirty="0"/>
+              <a:t>Kant, I. (1964) </a:t>
+            </a:r>
+            <a:r>
+              <a:rPr lang="es-ES" sz="800" i="1" dirty="0"/>
+              <a:t>Acerca de la relación entre la teoría y la práctica en la moral y en general</a:t>
+            </a:r>
+            <a:r>
+              <a:rPr lang="es-ES" sz="800" dirty="0"/>
+              <a:t>. (En: Kant, I. Filosofía de la historia. Ed. Nova).</a:t>
+            </a:r>
+            <a:endParaRPr lang="es-PE" sz="800" dirty="0"/>
+          </a:p>
+          <a:p>
+            <a:r>
+              <a:rPr lang="es-ES" sz="800" dirty="0"/>
+              <a:t>Kant, I. (1964) </a:t>
+            </a:r>
+            <a:r>
+              <a:rPr lang="es-ES" sz="800" i="1" dirty="0"/>
+              <a:t>Definición de la raza humana</a:t>
+            </a:r>
+            <a:r>
+              <a:rPr lang="es-ES" sz="800" dirty="0"/>
+              <a:t> (En: Kant, I. Filosofía de la historia. Ed. Nova).</a:t>
+            </a:r>
+            <a:endParaRPr lang="es-PE" sz="800" dirty="0"/>
+          </a:p>
+          <a:p>
+            <a:r>
+              <a:rPr lang="es-ES" sz="800" dirty="0"/>
+              <a:t>Kant, I. (1964) </a:t>
+            </a:r>
+            <a:r>
+              <a:rPr lang="es-ES" sz="800" i="1" dirty="0"/>
+              <a:t>Filosofía de la historia</a:t>
+            </a:r>
+            <a:r>
+              <a:rPr lang="es-ES" sz="800" dirty="0"/>
+              <a:t>. Ed. Nova.	</a:t>
+            </a:r>
+            <a:endParaRPr lang="es-PE" sz="800" dirty="0"/>
+          </a:p>
+          <a:p>
+            <a:r>
+              <a:rPr lang="es-ES" sz="800" dirty="0"/>
+              <a:t>Kant, I. (1964) </a:t>
+            </a:r>
+            <a:r>
+              <a:rPr lang="es-ES" sz="800" i="1" dirty="0"/>
+              <a:t>Ideas para una historia universal en sentido cosmopolita </a:t>
+            </a:r>
+            <a:r>
+              <a:rPr lang="es-ES" sz="800" dirty="0"/>
+              <a:t>(En: Filosofía de la historia. Ed. Nova).</a:t>
+            </a:r>
+            <a:endParaRPr lang="es-PE" sz="800" dirty="0"/>
+          </a:p>
+          <a:p>
+            <a:r>
+              <a:rPr lang="es-ES" sz="800" dirty="0"/>
+              <a:t>Kant, I. (1964) </a:t>
+            </a:r>
+            <a:r>
+              <a:rPr lang="es-ES" sz="800" i="1" dirty="0"/>
+              <a:t>Replanteamiento de la cuestión sobre si el género humano se halla en continuo progreso hacia lo mejor</a:t>
+            </a:r>
+            <a:r>
+              <a:rPr lang="es-ES" sz="800" dirty="0"/>
+              <a:t>. (En: Filosofía de la historia. Ed. Nova).</a:t>
+            </a:r>
+            <a:endParaRPr lang="es-PE" sz="800" dirty="0"/>
+          </a:p>
+          <a:p>
+            <a:r>
+              <a:rPr lang="es-ES" sz="800" dirty="0"/>
+              <a:t>Kant, I. (1964) </a:t>
+            </a:r>
+            <a:r>
+              <a:rPr lang="es-ES" sz="800" i="1" dirty="0"/>
+              <a:t>Respuesta a la pregunta: ¿qué es la ilustración?</a:t>
+            </a:r>
+            <a:r>
+              <a:rPr lang="es-ES" sz="800" dirty="0"/>
+              <a:t> (En: Kant, I. Filosofía de la historia. Ed. Nova).</a:t>
+            </a:r>
+            <a:endParaRPr lang="es-PE" sz="800" dirty="0"/>
+          </a:p>
+          <a:p>
+            <a:r>
+              <a:rPr lang="es-ES" sz="800" dirty="0"/>
+              <a:t>Kant, I. (1980) </a:t>
+            </a:r>
+            <a:r>
+              <a:rPr lang="es-ES" sz="800" i="1" dirty="0"/>
+              <a:t>La paz perpetua</a:t>
+            </a:r>
+            <a:r>
+              <a:rPr lang="es-ES" sz="800" dirty="0"/>
+              <a:t>. (En: Kant, I. Fundamentación de la metafísica de las costumbres, Crítica de la razón práctica y la Paz perpetua. Ed. Porrúa).</a:t>
+            </a:r>
+            <a:endParaRPr lang="es-PE" sz="800" dirty="0"/>
+          </a:p>
+          <a:p>
+            <a:r>
+              <a:rPr lang="es-ES" sz="800" dirty="0"/>
+              <a:t>Kant, I. (1988) </a:t>
+            </a:r>
+            <a:r>
+              <a:rPr lang="es-ES" sz="800" i="1" dirty="0"/>
+              <a:t>Lecciones de ética</a:t>
+            </a:r>
+            <a:r>
+              <a:rPr lang="es-ES" sz="800" dirty="0"/>
+              <a:t>. Editorial Crítica.</a:t>
+            </a:r>
+            <a:endParaRPr lang="es-PE" sz="800" dirty="0"/>
+          </a:p>
+          <a:p>
+            <a:r>
+              <a:rPr lang="es-PE" sz="800" dirty="0"/>
+              <a:t>Kant, I. (1991) </a:t>
+            </a:r>
+            <a:r>
+              <a:rPr lang="es-PE" sz="800" i="1" dirty="0"/>
+              <a:t>Kant </a:t>
+            </a:r>
+            <a:r>
+              <a:rPr lang="es-PE" sz="800" i="1" dirty="0" err="1"/>
+              <a:t>political</a:t>
+            </a:r>
+            <a:r>
+              <a:rPr lang="es-PE" sz="800" i="1" dirty="0"/>
+              <a:t> </a:t>
+            </a:r>
+            <a:r>
+              <a:rPr lang="es-PE" sz="800" i="1" dirty="0" err="1"/>
+              <a:t>writings</a:t>
+            </a:r>
+            <a:r>
+              <a:rPr lang="es-PE" sz="800" dirty="0"/>
+              <a:t>. </a:t>
+            </a:r>
+            <a:r>
+              <a:rPr lang="en-US" sz="800" dirty="0"/>
+              <a:t>Cambridge University Press. 2</a:t>
+            </a:r>
+            <a:r>
+              <a:rPr lang="en-US" sz="800" baseline="30000" dirty="0"/>
+              <a:t>nd</a:t>
+            </a:r>
+            <a:r>
+              <a:rPr lang="en-US" sz="800" dirty="0"/>
+              <a:t> edition. </a:t>
+            </a:r>
+            <a:r>
+              <a:rPr lang="es-PE" sz="800" dirty="0" err="1"/>
+              <a:t>Edited</a:t>
+            </a:r>
+            <a:r>
+              <a:rPr lang="es-PE" sz="800" dirty="0"/>
+              <a:t> </a:t>
+            </a:r>
+            <a:r>
+              <a:rPr lang="es-PE" sz="800" dirty="0" err="1"/>
+              <a:t>by</a:t>
+            </a:r>
+            <a:r>
+              <a:rPr lang="es-PE" sz="800" dirty="0"/>
+              <a:t>: H.S. </a:t>
+            </a:r>
+            <a:r>
+              <a:rPr lang="es-PE" sz="800" dirty="0" err="1"/>
+              <a:t>Reiss</a:t>
+            </a:r>
+            <a:endParaRPr lang="es-PE" sz="800" dirty="0"/>
+          </a:p>
+          <a:p>
+            <a:r>
+              <a:rPr lang="es-ES" sz="800" dirty="0"/>
+              <a:t>Kant, I. (2000) </a:t>
+            </a:r>
+            <a:r>
+              <a:rPr lang="es-ES" sz="800" i="1" dirty="0"/>
+              <a:t>Crítica de la razón práctica</a:t>
+            </a:r>
+            <a:r>
+              <a:rPr lang="es-ES" sz="800" dirty="0"/>
+              <a:t>. Alianza Editorial.</a:t>
+            </a:r>
+            <a:endParaRPr lang="es-PE" sz="800" dirty="0"/>
+          </a:p>
+          <a:p>
+            <a:r>
+              <a:rPr lang="es-ES" sz="800" dirty="0"/>
+              <a:t>Kant, I. (2005) </a:t>
+            </a:r>
+            <a:r>
+              <a:rPr lang="es-ES" sz="800" i="1" dirty="0"/>
+              <a:t>Cómo orientarse en el pensamiento</a:t>
+            </a:r>
+            <a:r>
+              <a:rPr lang="es-ES" sz="800" dirty="0"/>
+              <a:t>. Ed. </a:t>
+            </a:r>
+            <a:r>
+              <a:rPr lang="es-ES" sz="800" dirty="0" err="1"/>
+              <a:t>Quadrata</a:t>
+            </a:r>
+            <a:r>
+              <a:rPr lang="es-ES" sz="800" dirty="0"/>
+              <a:t>.</a:t>
+            </a:r>
+            <a:endParaRPr lang="es-PE" sz="800" dirty="0"/>
+          </a:p>
+          <a:p>
+            <a:r>
+              <a:rPr lang="es-ES" sz="800" dirty="0"/>
+              <a:t>Kant, I. (2008) </a:t>
+            </a:r>
+            <a:r>
+              <a:rPr lang="es-ES" sz="800" i="1" dirty="0"/>
+              <a:t>Fundamentación de la metafísica de las costumbres</a:t>
+            </a:r>
+            <a:r>
+              <a:rPr lang="es-ES" sz="800" dirty="0"/>
+              <a:t>. Ed. Austral.</a:t>
+            </a:r>
+            <a:endParaRPr lang="es-PE" sz="800" dirty="0"/>
+          </a:p>
+          <a:p>
+            <a:r>
+              <a:rPr lang="es-ES" sz="800" dirty="0"/>
+              <a:t>Kant, I. (2008) </a:t>
+            </a:r>
+            <a:r>
+              <a:rPr lang="es-ES" sz="800" i="1" dirty="0"/>
+              <a:t>Principios metafísicos del derecho</a:t>
+            </a:r>
+            <a:r>
+              <a:rPr lang="es-ES" sz="800" dirty="0"/>
+              <a:t>. Trad. G. </a:t>
+            </a:r>
+            <a:r>
+              <a:rPr lang="es-ES" sz="800" dirty="0" err="1"/>
+              <a:t>Lizarraga</a:t>
+            </a:r>
+            <a:r>
+              <a:rPr lang="es-ES" sz="800" dirty="0"/>
+              <a:t>. Ed. Renacimiento.</a:t>
+            </a:r>
+            <a:endParaRPr lang="es-PE" sz="800" dirty="0"/>
+          </a:p>
+          <a:p>
+            <a:r>
+              <a:rPr lang="es-ES" sz="800" dirty="0"/>
+              <a:t>Kant, I. (2009) </a:t>
+            </a:r>
+            <a:r>
+              <a:rPr lang="es-ES" sz="800" i="1" dirty="0"/>
+              <a:t>Sobre Pedagogía</a:t>
+            </a:r>
+            <a:r>
+              <a:rPr lang="es-ES" sz="800" dirty="0"/>
+              <a:t>. Universidad Nacional de Córdoba. </a:t>
+            </a:r>
+            <a:r>
+              <a:rPr lang="es-PE" sz="800" dirty="0"/>
+              <a:t>Encuentro Grupo Editor. </a:t>
+            </a:r>
+          </a:p>
+        </p:txBody>
+      </p:sp>
+    </p:spTree>
+    <p:extLst>
+      <p:ext uri="{BB962C8B-B14F-4D97-AF65-F5344CB8AC3E}">
+        <p14:creationId xmlns:p14="http://schemas.microsoft.com/office/powerpoint/2010/main" val="2164092368"/>
       </p:ext>
     </p:extLst>
   </p:cSld>
@@ -3704,11 +4854,7 @@
             </a:br>
             <a:r>
               <a:rPr lang="es-PE" dirty="0" smtClean="0"/>
-              <a:t> en el proyecto crítico de </a:t>
-            </a:r>
-            <a:r>
-              <a:rPr lang="es-PE" dirty="0" smtClean="0"/>
-              <a:t>Kant</a:t>
+              <a:t> en el proyecto crítico de Kant</a:t>
             </a:r>
             <a:br>
               <a:rPr lang="es-PE" dirty="0" smtClean="0"/>
@@ -3868,21 +5014,48 @@
           <a:chExt cx="0" cy="0"/>
         </a:xfrm>
       </p:grpSpPr>
-      <p:sp>
-        <p:nvSpPr>
-          <p:cNvPr id="2" name="Título 1"/>
-          <p:cNvSpPr>
-            <a:spLocks noGrp="1"/>
-          </p:cNvSpPr>
-          <p:nvPr>
-            <p:ph type="ctrTitle"/>
-          </p:nvPr>
-        </p:nvSpPr>
+      <p:pic>
+        <p:nvPicPr>
+          <p:cNvPr id="3" name="Imagen 2"/>
+          <p:cNvPicPr>
+            <a:picLocks noChangeAspect="1"/>
+          </p:cNvPicPr>
+          <p:nvPr/>
+        </p:nvPicPr>
+        <p:blipFill>
+          <a:blip r:embed="rId2"/>
+          <a:stretch>
+            <a:fillRect/>
+          </a:stretch>
+        </p:blipFill>
         <p:spPr>
           <a:xfrm>
-            <a:off x="851139" y="1121434"/>
-            <a:ext cx="10052649" cy="3933644"/>
+            <a:off x="0" y="0"/>
+            <a:ext cx="12192000" cy="6882034"/>
           </a:xfrm>
+          <a:prstGeom prst="rect">
+            <a:avLst/>
+          </a:prstGeom>
+        </p:spPr>
+      </p:pic>
+      <p:sp>
+        <p:nvSpPr>
+          <p:cNvPr id="2" name="Título 1"/>
+          <p:cNvSpPr>
+            <a:spLocks noGrp="1"/>
+          </p:cNvSpPr>
+          <p:nvPr>
+            <p:ph type="ctrTitle"/>
+          </p:nvPr>
+        </p:nvSpPr>
+        <p:spPr>
+          <a:xfrm>
+            <a:off x="4010844" y="433952"/>
+            <a:ext cx="4170312" cy="930292"/>
+          </a:xfrm>
+          <a:solidFill>
+            <a:schemeClr val="tx1"/>
+          </a:solidFill>
         </p:spPr>
         <p:txBody>
           <a:bodyPr>
@@ -3893,47 +5066,31 @@
             <a:r>
               <a:rPr lang="es-PE" sz="2800" b="1" u="sng" dirty="0" smtClean="0">
                 <a:solidFill>
-                  <a:srgbClr val="FF0000"/>
+                  <a:schemeClr val="bg1"/>
                 </a:solidFill>
               </a:rPr>
-              <a:t>¿como es posible la metafísica como ciencia?</a:t>
+              <a:t>¿cómo es posible la </a:t>
             </a:r>
             <a:br>
               <a:rPr lang="es-PE" sz="2800" b="1" u="sng" dirty="0" smtClean="0">
                 <a:solidFill>
-                  <a:srgbClr val="FF0000"/>
+                  <a:schemeClr val="bg1"/>
                 </a:solidFill>
               </a:rPr>
             </a:br>
             <a:r>
-              <a:rPr lang="es-PE" sz="2800" dirty="0" smtClean="0"/>
-              <a:t/>
-            </a:r>
-            <a:br>
-              <a:rPr lang="es-PE" sz="2800" dirty="0" smtClean="0"/>
-            </a:br>
-            <a:r>
-              <a:rPr lang="es-PE" sz="2800" dirty="0" smtClean="0"/>
-              <a:t> juicios sintéticos a priori son herramienta para llegar a responder eso, como sucede en la lógica y matemática</a:t>
-            </a:r>
-            <a:br>
-              <a:rPr lang="es-PE" sz="2800" dirty="0" smtClean="0"/>
-            </a:br>
-            <a:r>
-              <a:rPr lang="es-PE" sz="2800" dirty="0" smtClean="0"/>
-              <a:t/>
-            </a:r>
-            <a:br>
-              <a:rPr lang="es-PE" sz="2800" dirty="0" smtClean="0"/>
-            </a:br>
-            <a:r>
-              <a:rPr lang="es-PE" sz="2800" dirty="0" smtClean="0"/>
-              <a:t>Para que la metafísica sea una ciencia segura, hay que delimitar el uso teórico de la razón, conocimiento constitutivo y por otro lado, el uso practico produce principios para la acción y leyes morales.</a:t>
-            </a:r>
-            <a:br>
-              <a:rPr lang="es-PE" sz="2800" dirty="0" smtClean="0"/>
-            </a:br>
-            <a:endParaRPr lang="es-PE" sz="2800" dirty="0"/>
+              <a:rPr lang="es-PE" sz="2800" b="1" u="sng" dirty="0" smtClean="0">
+                <a:solidFill>
+                  <a:schemeClr val="bg1"/>
+                </a:solidFill>
+              </a:rPr>
+              <a:t>metafísica como ciencia?</a:t>
+            </a:r>
+            <a:endParaRPr lang="es-PE" sz="2800" dirty="0">
+              <a:solidFill>
+                <a:schemeClr val="bg1"/>
+              </a:solidFill>
+            </a:endParaRPr>
           </a:p>
         </p:txBody>
       </p:sp>
@@ -3979,8 +5136,8 @@
         </p:nvSpPr>
         <p:spPr>
           <a:xfrm>
-            <a:off x="2135560" y="14108"/>
-            <a:ext cx="8229600" cy="1152128"/>
+            <a:off x="2042570" y="277579"/>
+            <a:ext cx="8229600" cy="636821"/>
           </a:xfrm>
         </p:spPr>
         <p:txBody>
@@ -4038,7 +5195,7 @@
         </p:nvSpPr>
         <p:spPr>
           <a:xfrm>
-            <a:off x="2135560" y="836712"/>
+            <a:off x="2244048" y="1166236"/>
             <a:ext cx="8229600" cy="3384376"/>
           </a:xfrm>
           <a:prstGeom prst="rect">
@@ -4187,16 +5344,16 @@
             </a:lvl9pPr>
           </a:lstStyle>
           <a:p>
-            <a:pPr marL="514350" indent="-514350">
-              <a:buFont typeface="Arial" pitchFamily="34" charset="0"/>
-              <a:buAutoNum type="arabicPeriod"/>
-            </a:pPr>
-            <a:r>
-              <a:rPr lang="es-PE" dirty="0"/>
-              <a:t>Criticar la razón por la razón misma para establecer los </a:t>
-            </a:r>
-            <a:r>
-              <a:rPr lang="es-PE" b="1" u="sng" dirty="0">
+            <a:r>
+              <a:rPr lang="es-PE" sz="2800" dirty="0" smtClean="0"/>
+              <a:t>Establecer </a:t>
+            </a:r>
+            <a:r>
+              <a:rPr lang="es-PE" sz="2800" dirty="0"/>
+              <a:t>los </a:t>
+            </a:r>
+            <a:r>
+              <a:rPr lang="es-PE" sz="2800" b="1" u="sng" dirty="0">
                 <a:solidFill>
                   <a:srgbClr val="FF0000"/>
                 </a:solidFill>
@@ -4204,17 +5361,35 @@
               <a:t>límites del conocimiento </a:t>
             </a:r>
             <a:r>
-              <a:rPr lang="es-PE" dirty="0"/>
-              <a:t>(Revolución copernicana)</a:t>
-            </a:r>
-          </a:p>
-          <a:p>
-            <a:pPr marL="514350" indent="-514350">
-              <a:buFont typeface="Arial" pitchFamily="34" charset="0"/>
-              <a:buAutoNum type="arabicPeriod"/>
-            </a:pPr>
-            <a:r>
-              <a:rPr lang="es-PE" dirty="0">
+              <a:rPr lang="es-PE" sz="2800" dirty="0"/>
+              <a:t>(Revolución copernicana</a:t>
+            </a:r>
+            <a:r>
+              <a:rPr lang="es-PE" sz="2800" dirty="0" smtClean="0"/>
+              <a:t>)</a:t>
+            </a:r>
+          </a:p>
+          <a:p>
+            <a:r>
+              <a:rPr lang="es-PE" sz="2800" b="1" u="sng" dirty="0"/>
+              <a:t>Crítica a la </a:t>
+            </a:r>
+            <a:r>
+              <a:rPr lang="es-PE" sz="2800" b="1" u="sng" dirty="0" smtClean="0"/>
+              <a:t>metafísica dogmática</a:t>
+            </a:r>
+            <a:endParaRPr lang="es-PE" sz="2800" b="1" u="sng" dirty="0"/>
+          </a:p>
+          <a:p>
+            <a:r>
+              <a:rPr lang="es-PE" sz="2800" dirty="0" smtClean="0"/>
+              <a:t>Giro copernicano</a:t>
+            </a:r>
+            <a:endParaRPr lang="es-PE" sz="2800" dirty="0"/>
+          </a:p>
+          <a:p>
+            <a:r>
+              <a:rPr lang="es-PE" sz="2800" dirty="0">
                 <a:solidFill>
                   <a:srgbClr val="FF0000"/>
                 </a:solidFill>
@@ -4222,7 +5397,7 @@
               <a:t>Diferenciar </a:t>
             </a:r>
             <a:r>
-              <a:rPr lang="es-PE" b="1" u="sng" dirty="0">
+              <a:rPr lang="es-PE" sz="2800" b="1" u="sng" dirty="0">
                 <a:solidFill>
                   <a:srgbClr val="FF0000"/>
                 </a:solidFill>
@@ -4231,62 +5406,48 @@
             </a:r>
           </a:p>
           <a:p>
-            <a:pPr marL="514350" indent="-514350">
-              <a:buFont typeface="Arial" pitchFamily="34" charset="0"/>
-              <a:buAutoNum type="arabicPeriod"/>
-            </a:pPr>
-            <a:r>
-              <a:rPr lang="es-PE" dirty="0"/>
+            <a:r>
+              <a:rPr lang="es-PE" sz="2800" dirty="0"/>
               <a:t>Establecer </a:t>
             </a:r>
             <a:r>
-              <a:rPr lang="es-PE" b="1" u="sng" dirty="0"/>
+              <a:rPr lang="es-PE" sz="2800" b="1" u="sng" dirty="0"/>
               <a:t>formas puras de conocimiento </a:t>
             </a:r>
             <a:r>
-              <a:rPr lang="es-PE" dirty="0"/>
+              <a:rPr lang="es-PE" sz="2800" dirty="0"/>
               <a:t>(a priori)</a:t>
             </a:r>
           </a:p>
           <a:p>
-            <a:pPr marL="514350" indent="-514350">
-              <a:buFont typeface="Arial" pitchFamily="34" charset="0"/>
-              <a:buAutoNum type="arabicPeriod"/>
-            </a:pPr>
-            <a:r>
-              <a:rPr lang="es-PE" dirty="0"/>
+            <a:r>
+              <a:rPr lang="es-PE" sz="2800" dirty="0"/>
               <a:t>Establecer tipos de </a:t>
             </a:r>
             <a:r>
-              <a:rPr lang="es-PE" b="1" u="sng" dirty="0"/>
+              <a:rPr lang="es-PE" sz="2800" b="1" u="sng" dirty="0"/>
               <a:t>juicios</a:t>
             </a:r>
           </a:p>
           <a:p>
-            <a:pPr marL="514350" indent="-514350">
-              <a:buFont typeface="Arial" pitchFamily="34" charset="0"/>
-              <a:buAutoNum type="arabicPeriod"/>
-            </a:pPr>
-            <a:r>
-              <a:rPr lang="es-PE" b="1" u="sng" dirty="0"/>
-              <a:t>Crítica a la metafísica</a:t>
-            </a:r>
-          </a:p>
-          <a:p>
-            <a:pPr marL="514350" indent="-514350">
-              <a:buFont typeface="Arial" pitchFamily="34" charset="0"/>
-              <a:buAutoNum type="arabicPeriod"/>
-            </a:pPr>
-            <a:r>
-              <a:rPr lang="es-PE" dirty="0">
+            <a:r>
+              <a:rPr lang="es-PE" sz="2800" dirty="0" smtClean="0">
                 <a:solidFill>
                   <a:srgbClr val="FF0000"/>
                 </a:solidFill>
               </a:rPr>
-              <a:t>Distinguir el </a:t>
-            </a:r>
-            <a:r>
-              <a:rPr lang="es-PE" b="1" u="sng" dirty="0">
+              <a:t>Distinguir </a:t>
+            </a:r>
+            <a:r>
+              <a:rPr lang="es-PE" sz="2800" dirty="0">
+                <a:solidFill>
+                  <a:srgbClr val="FF0000"/>
+                </a:solidFill>
+              </a:rPr>
+              <a:t>el </a:t>
+            </a:r>
+            <a:r>
+              <a:rPr lang="es-PE" sz="2800" b="1" u="sng" dirty="0">
                 <a:solidFill>
                   <a:srgbClr val="FF0000"/>
                 </a:solidFill>
@@ -4294,7 +5455,7 @@
               <a:t>uso teórico</a:t>
             </a:r>
             <a:r>
-              <a:rPr lang="es-PE" dirty="0">
+              <a:rPr lang="es-PE" sz="2800" dirty="0">
                 <a:solidFill>
                   <a:srgbClr val="FF0000"/>
                 </a:solidFill>
@@ -4302,7 +5463,7 @@
               <a:t> de la razón y el </a:t>
             </a:r>
             <a:r>
-              <a:rPr lang="es-PE" b="1" u="sng" dirty="0">
+              <a:rPr lang="es-PE" sz="2800" b="1" u="sng" dirty="0">
                 <a:solidFill>
                   <a:srgbClr val="FF0000"/>
                 </a:solidFill>
@@ -4310,7 +5471,7 @@
               <a:t>uso práctico</a:t>
             </a:r>
             <a:r>
-              <a:rPr lang="es-PE" dirty="0">
+              <a:rPr lang="es-PE" sz="2800" dirty="0">
                 <a:solidFill>
                   <a:srgbClr val="FF0000"/>
                 </a:solidFill>
@@ -4373,52 +5534,84 @@
           <a:lstStyle/>
           <a:p>
             <a:r>
-              <a:rPr lang="es-PE" sz="4400" dirty="0" smtClean="0"/>
+              <a:rPr lang="es-PE" sz="4000" dirty="0" smtClean="0"/>
               <a:t>1. Proyecto crítico</a:t>
             </a:r>
             <a:br>
-              <a:rPr lang="es-PE" sz="4400" dirty="0" smtClean="0"/>
+              <a:rPr lang="es-PE" sz="4000" dirty="0" smtClean="0"/>
             </a:br>
             <a:r>
-              <a:rPr lang="es-PE" sz="4400" dirty="0" smtClean="0"/>
-              <a:t>- crítica de la razón</a:t>
+              <a:rPr lang="es-PE" sz="4000" dirty="0" smtClean="0"/>
+              <a:t>- crítica de la razón: límites del conocimiento, rechazo a la metafísica tradicional</a:t>
             </a:r>
             <a:br>
-              <a:rPr lang="es-PE" sz="4400" dirty="0" smtClean="0"/>
+              <a:rPr lang="es-PE" sz="4000" dirty="0" smtClean="0"/>
             </a:br>
             <a:r>
-              <a:rPr lang="es-PE" sz="4400" dirty="0" smtClean="0"/>
-              <a:t>- invitación a la autonomía</a:t>
+              <a:rPr lang="es-PE" sz="4000" dirty="0" smtClean="0">
+                <a:solidFill>
+                  <a:schemeClr val="accent6"/>
+                </a:solidFill>
+              </a:rPr>
+              <a:t>- </a:t>
+            </a:r>
+            <a:r>
+              <a:rPr lang="es-PE" sz="4000" dirty="0" smtClean="0">
+                <a:solidFill>
+                  <a:schemeClr val="accent6"/>
+                </a:solidFill>
+              </a:rPr>
+              <a:t>¿invitación </a:t>
+            </a:r>
+            <a:r>
+              <a:rPr lang="es-PE" sz="4000" dirty="0" smtClean="0">
+                <a:solidFill>
+                  <a:schemeClr val="accent6"/>
+                </a:solidFill>
+              </a:rPr>
+              <a:t>a la </a:t>
+            </a:r>
+            <a:r>
+              <a:rPr lang="es-PE" sz="4000" dirty="0" smtClean="0">
+                <a:solidFill>
+                  <a:schemeClr val="accent6"/>
+                </a:solidFill>
+              </a:rPr>
+              <a:t>autonomía?</a:t>
+            </a:r>
+            <a:r>
+              <a:rPr lang="es-PE" sz="4000" dirty="0" smtClean="0"/>
+              <a:t/>
             </a:r>
             <a:br>
-              <a:rPr lang="es-PE" sz="4400" dirty="0" smtClean="0"/>
+              <a:rPr lang="es-PE" sz="4000" dirty="0" smtClean="0"/>
             </a:br>
             <a:r>
-              <a:rPr lang="es-PE" sz="4400" dirty="0" smtClean="0"/>
+              <a:rPr lang="es-PE" sz="4000" dirty="0" smtClean="0"/>
               <a:t/>
             </a:r>
             <a:br>
-              <a:rPr lang="es-PE" sz="4400" dirty="0" smtClean="0"/>
+              <a:rPr lang="es-PE" sz="4000" dirty="0" smtClean="0"/>
             </a:br>
             <a:r>
-              <a:rPr lang="es-PE" sz="4400" dirty="0" smtClean="0"/>
-              <a:t>Teoría = límites del conocimiento</a:t>
+              <a:rPr lang="es-PE" sz="4000" dirty="0" smtClean="0"/>
+              <a:t>R. Pura = límites y reglas del conocimiento</a:t>
             </a:r>
             <a:br>
-              <a:rPr lang="es-PE" sz="4400" dirty="0" smtClean="0"/>
+              <a:rPr lang="es-PE" sz="4000" dirty="0" smtClean="0"/>
             </a:br>
             <a:r>
-              <a:rPr lang="es-PE" sz="4400" dirty="0" smtClean="0"/>
-              <a:t>Práctica = asuntos morales (ética, derecho, política, educación, religión, historia)</a:t>
-            </a:r>
-            <a:r>
-              <a:rPr lang="es-PE" sz="4400" dirty="0"/>
+              <a:rPr lang="es-PE" sz="4000" dirty="0" smtClean="0"/>
+              <a:t>R. Práctica = asuntos morales (ética, derecho, política, educación, religión, historia)</a:t>
+            </a:r>
+            <a:r>
+              <a:rPr lang="es-PE" sz="4000" dirty="0"/>
               <a:t/>
             </a:r>
             <a:br>
-              <a:rPr lang="es-PE" sz="4400" dirty="0"/>
+              <a:rPr lang="es-PE" sz="4000" dirty="0"/>
             </a:br>
-            <a:endParaRPr lang="es-PE" sz="4400" dirty="0"/>
+            <a:endParaRPr lang="es-PE" sz="4000" dirty="0"/>
           </a:p>
         </p:txBody>
       </p:sp>
@@ -4511,11 +5704,7 @@
             </a:br>
             <a:r>
               <a:rPr lang="es-PE" sz="4800" dirty="0" smtClean="0"/>
-              <a:t>1.4 </a:t>
-            </a:r>
-            <a:r>
-              <a:rPr lang="es-PE" sz="4800" dirty="0" smtClean="0"/>
-              <a:t>Política</a:t>
+              <a:t>1.4 Política</a:t>
             </a:r>
             <a:br>
               <a:rPr lang="es-PE" sz="4800" dirty="0" smtClean="0"/>
@@ -4620,6 +5809,322 @@
         </p:nvSpPr>
         <p:spPr>
           <a:xfrm>
+            <a:off x="-1701216" y="4355184"/>
+            <a:ext cx="10052649" cy="1206769"/>
+          </a:xfrm>
+        </p:spPr>
+        <p:txBody>
+          <a:bodyPr>
+            <a:noAutofit/>
+          </a:bodyPr>
+          <a:lstStyle/>
+          <a:p>
+            <a:r>
+              <a:rPr lang="es-PE" sz="3600" dirty="0" smtClean="0"/>
+              <a:t>1. Proyecto crítico</a:t>
+            </a:r>
+            <a:br>
+              <a:rPr lang="es-PE" sz="3600" dirty="0" smtClean="0"/>
+            </a:br>
+            <a:r>
+              <a:rPr lang="es-PE" sz="3600" dirty="0"/>
+              <a:t/>
+            </a:r>
+            <a:br>
+              <a:rPr lang="es-PE" sz="3600" dirty="0"/>
+            </a:br>
+            <a:r>
+              <a:rPr lang="es-PE" sz="3600" dirty="0" smtClean="0"/>
+              <a:t>1.1 Qué es el </a:t>
+            </a:r>
+            <a:r>
+              <a:rPr lang="es-PE" sz="3200" dirty="0" smtClean="0"/>
+              <a:t>proyecto</a:t>
+            </a:r>
+            <a:r>
+              <a:rPr lang="es-PE" sz="3600" dirty="0" smtClean="0"/>
+              <a:t> crítico</a:t>
+            </a:r>
+            <a:br>
+              <a:rPr lang="es-PE" sz="3600" dirty="0" smtClean="0"/>
+            </a:br>
+            <a:r>
+              <a:rPr lang="es-PE" sz="3600" dirty="0" smtClean="0"/>
+              <a:t>1.2 Moral</a:t>
+            </a:r>
+            <a:br>
+              <a:rPr lang="es-PE" sz="3600" dirty="0" smtClean="0"/>
+            </a:br>
+            <a:r>
+              <a:rPr lang="es-PE" sz="3600" dirty="0" smtClean="0"/>
+              <a:t>1.3 Derecho</a:t>
+            </a:r>
+            <a:br>
+              <a:rPr lang="es-PE" sz="3600" dirty="0" smtClean="0"/>
+            </a:br>
+            <a:r>
+              <a:rPr lang="es-PE" sz="3600" dirty="0" smtClean="0"/>
+              <a:t>1.4 Política</a:t>
+            </a:r>
+            <a:br>
+              <a:rPr lang="es-PE" sz="3600" dirty="0" smtClean="0"/>
+            </a:br>
+            <a:r>
+              <a:rPr lang="es-PE" sz="3600" dirty="0" smtClean="0">
+                <a:solidFill>
+                  <a:schemeClr val="bg1">
+                    <a:lumMod val="75000"/>
+                  </a:schemeClr>
+                </a:solidFill>
+              </a:rPr>
+              <a:t>1.5 Historia</a:t>
+            </a:r>
+            <a:br>
+              <a:rPr lang="es-PE" sz="3600" dirty="0" smtClean="0">
+                <a:solidFill>
+                  <a:schemeClr val="bg1">
+                    <a:lumMod val="75000"/>
+                  </a:schemeClr>
+                </a:solidFill>
+              </a:rPr>
+            </a:br>
+            <a:r>
+              <a:rPr lang="es-PE" sz="3600" dirty="0" smtClean="0">
+                <a:solidFill>
+                  <a:schemeClr val="bg1">
+                    <a:lumMod val="75000"/>
+                  </a:schemeClr>
+                </a:solidFill>
+              </a:rPr>
+              <a:t>1.6 Religión</a:t>
+            </a:r>
+            <a:br>
+              <a:rPr lang="es-PE" sz="3600" dirty="0" smtClean="0">
+                <a:solidFill>
+                  <a:schemeClr val="bg1">
+                    <a:lumMod val="75000"/>
+                  </a:schemeClr>
+                </a:solidFill>
+              </a:rPr>
+            </a:br>
+            <a:r>
+              <a:rPr lang="es-PE" sz="3600" dirty="0" smtClean="0">
+                <a:solidFill>
+                  <a:schemeClr val="bg1">
+                    <a:lumMod val="75000"/>
+                  </a:schemeClr>
+                </a:solidFill>
+              </a:rPr>
+              <a:t>1.7 Antropología</a:t>
+            </a:r>
+            <a:endParaRPr lang="es-PE" sz="3600" dirty="0">
+              <a:solidFill>
+                <a:schemeClr val="bg1">
+                  <a:lumMod val="75000"/>
+                </a:schemeClr>
+              </a:solidFill>
+            </a:endParaRPr>
+          </a:p>
+        </p:txBody>
+      </p:sp>
+      <p:sp>
+        <p:nvSpPr>
+          <p:cNvPr id="3" name="Rectángulo 2"/>
+          <p:cNvSpPr/>
+          <p:nvPr/>
+        </p:nvSpPr>
+        <p:spPr>
+          <a:xfrm>
+            <a:off x="1976755" y="3049878"/>
+            <a:ext cx="2696705" cy="1007390"/>
+          </a:xfrm>
+          <a:prstGeom prst="rect">
+            <a:avLst/>
+          </a:prstGeom>
+          <a:noFill/>
+          <a:ln w="76200">
+            <a:solidFill>
+              <a:srgbClr val="FF0000"/>
+            </a:solidFill>
+          </a:ln>
+        </p:spPr>
+        <p:style>
+          <a:lnRef idx="2">
+            <a:schemeClr val="accent1">
+              <a:shade val="50000"/>
+            </a:schemeClr>
+          </a:lnRef>
+          <a:fillRef idx="1">
+            <a:schemeClr val="accent1"/>
+          </a:fillRef>
+          <a:effectRef idx="0">
+            <a:schemeClr val="accent1"/>
+          </a:effectRef>
+          <a:fontRef idx="minor">
+            <a:schemeClr val="lt1"/>
+          </a:fontRef>
+        </p:style>
+        <p:txBody>
+          <a:bodyPr rtlCol="0" anchor="ctr"/>
+          <a:lstStyle/>
+          <a:p>
+            <a:pPr algn="ctr"/>
+            <a:endParaRPr lang="es-PE"/>
+          </a:p>
+        </p:txBody>
+      </p:sp>
+      <p:sp>
+        <p:nvSpPr>
+          <p:cNvPr id="4" name="CuadroTexto 3"/>
+          <p:cNvSpPr txBox="1"/>
+          <p:nvPr/>
+        </p:nvSpPr>
+        <p:spPr>
+          <a:xfrm>
+            <a:off x="6539345" y="2373245"/>
+            <a:ext cx="5527964" cy="2585323"/>
+          </a:xfrm>
+          <a:prstGeom prst="rect">
+            <a:avLst/>
+          </a:prstGeom>
+          <a:noFill/>
+        </p:spPr>
+        <p:txBody>
+          <a:bodyPr wrap="square" rtlCol="0">
+            <a:spAutoFit/>
+          </a:bodyPr>
+          <a:lstStyle/>
+          <a:p>
+            <a:r>
+              <a:rPr lang="es-PE" dirty="0" smtClean="0"/>
+              <a:t>Razón pública</a:t>
+            </a:r>
+          </a:p>
+          <a:p>
+            <a:r>
+              <a:rPr lang="es-PE" dirty="0" smtClean="0"/>
+              <a:t>Tolerancia</a:t>
+            </a:r>
+          </a:p>
+          <a:p>
+            <a:r>
+              <a:rPr lang="es-PE" dirty="0" smtClean="0"/>
+              <a:t>Uso no dogmático de la razón</a:t>
+            </a:r>
+          </a:p>
+          <a:p>
+            <a:r>
+              <a:rPr lang="es-PE" dirty="0" smtClean="0"/>
+              <a:t>Voluntad unificada del pueblo</a:t>
+            </a:r>
+          </a:p>
+          <a:p>
+            <a:r>
+              <a:rPr lang="es-PE" dirty="0" smtClean="0"/>
+              <a:t>Republicanismo</a:t>
+            </a:r>
+          </a:p>
+          <a:p>
+            <a:r>
+              <a:rPr lang="es-PE" dirty="0" smtClean="0"/>
+              <a:t>Paz perpetua</a:t>
+            </a:r>
+          </a:p>
+          <a:p>
+            <a:r>
+              <a:rPr lang="es-PE" dirty="0" smtClean="0"/>
+              <a:t>Cosmopolitismo</a:t>
+            </a:r>
+          </a:p>
+          <a:p>
+            <a:r>
+              <a:rPr lang="es-PE" dirty="0" smtClean="0"/>
+              <a:t>Sociedad civil</a:t>
+            </a:r>
+          </a:p>
+          <a:p>
+            <a:endParaRPr lang="es-PE" dirty="0"/>
+          </a:p>
+        </p:txBody>
+      </p:sp>
+      <p:cxnSp>
+        <p:nvCxnSpPr>
+          <p:cNvPr id="6" name="Conector recto de flecha 5"/>
+          <p:cNvCxnSpPr/>
+          <p:nvPr/>
+        </p:nvCxnSpPr>
+        <p:spPr>
+          <a:xfrm>
+            <a:off x="4673460" y="3553573"/>
+            <a:ext cx="1450249" cy="0"/>
+          </a:xfrm>
+          <a:prstGeom prst="straightConnector1">
+            <a:avLst/>
+          </a:prstGeom>
+          <a:ln w="76200">
+            <a:solidFill>
+              <a:srgbClr val="FF0000"/>
+            </a:solidFill>
+            <a:tailEnd type="triangle"/>
+          </a:ln>
+        </p:spPr>
+        <p:style>
+          <a:lnRef idx="1">
+            <a:schemeClr val="accent1"/>
+          </a:lnRef>
+          <a:fillRef idx="0">
+            <a:schemeClr val="accent1"/>
+          </a:fillRef>
+          <a:effectRef idx="0">
+            <a:schemeClr val="accent1"/>
+          </a:effectRef>
+          <a:fontRef idx="minor">
+            <a:schemeClr val="tx1"/>
+          </a:fontRef>
+        </p:style>
+      </p:cxnSp>
+    </p:spTree>
+    <p:extLst>
+      <p:ext uri="{BB962C8B-B14F-4D97-AF65-F5344CB8AC3E}">
+        <p14:creationId xmlns:p14="http://schemas.microsoft.com/office/powerpoint/2010/main" val="2471607823"/>
+      </p:ext>
+    </p:extLst>
+  </p:cSld>
+  <p:clrMapOvr>
+    <a:masterClrMapping/>
+  </p:clrMapOvr>
+</p:sld>
+</file>
+
+<file path=ppt/slides/slide9.xml><?xml version="1.0" encoding="utf-8"?>
+<p:sld xmlns:a="http://schemas.openxmlformats.org/drawingml/2006/main" xmlns:r="http://schemas.openxmlformats.org/officeDocument/2006/relationships" xmlns:p="http://schemas.openxmlformats.org/presentationml/2006/main">
+  <p:cSld>
+    <p:spTree>
+      <p:nvGrpSpPr>
+        <p:cNvPr id="1" name=""/>
+        <p:cNvGrpSpPr/>
+        <p:nvPr/>
+      </p:nvGrpSpPr>
+      <p:grpSpPr>
+        <a:xfrm>
+          <a:off x="0" y="0"/>
+          <a:ext cx="0" cy="0"/>
+          <a:chOff x="0" y="0"/>
+          <a:chExt cx="0" cy="0"/>
+        </a:xfrm>
+      </p:grpSpPr>
+      <p:sp>
+        <p:nvSpPr>
+          <p:cNvPr id="2" name="Título 1"/>
+          <p:cNvSpPr>
+            <a:spLocks noGrp="1"/>
+          </p:cNvSpPr>
+          <p:nvPr>
+            <p:ph type="ctrTitle"/>
+          </p:nvPr>
+        </p:nvSpPr>
+        <p:spPr>
+          <a:xfrm>
             <a:off x="1058171" y="294226"/>
             <a:ext cx="10052649" cy="1206769"/>
           </a:xfrm>
@@ -4670,110 +6175,6 @@
     <p:extLst>
       <p:ext uri="{BB962C8B-B14F-4D97-AF65-F5344CB8AC3E}">
         <p14:creationId xmlns:p14="http://schemas.microsoft.com/office/powerpoint/2010/main" val="2535221155"/>
-      </p:ext>
-    </p:extLst>
-  </p:cSld>
-  <p:clrMapOvr>
-    <a:masterClrMapping/>
-  </p:clrMapOvr>
-</p:sld>
-</file>
-
-<file path=ppt/slides/slide9.xml><?xml version="1.0" encoding="utf-8"?>
-<p:sld xmlns:a="http://schemas.openxmlformats.org/drawingml/2006/main" xmlns:r="http://schemas.openxmlformats.org/officeDocument/2006/relationships" xmlns:p="http://schemas.openxmlformats.org/presentationml/2006/main">
-  <p:cSld>
-    <p:spTree>
-      <p:nvGrpSpPr>
-        <p:cNvPr id="1" name=""/>
-        <p:cNvGrpSpPr/>
-        <p:nvPr/>
-      </p:nvGrpSpPr>
-      <p:grpSpPr>
-        <a:xfrm>
-          <a:off x="0" y="0"/>
-          <a:ext cx="0" cy="0"/>
-          <a:chOff x="0" y="0"/>
-          <a:chExt cx="0" cy="0"/>
-        </a:xfrm>
-      </p:grpSpPr>
-      <p:sp>
-        <p:nvSpPr>
-          <p:cNvPr id="2" name="Título 1"/>
-          <p:cNvSpPr>
-            <a:spLocks noGrp="1"/>
-          </p:cNvSpPr>
-          <p:nvPr>
-            <p:ph type="ctrTitle"/>
-          </p:nvPr>
-        </p:nvSpPr>
-        <p:spPr>
-          <a:xfrm>
-            <a:off x="661358" y="5073259"/>
-            <a:ext cx="10052649" cy="1206769"/>
-          </a:xfrm>
-        </p:spPr>
-        <p:txBody>
-          <a:bodyPr>
-            <a:normAutofit fontScale="90000"/>
-          </a:bodyPr>
-          <a:lstStyle/>
-          <a:p>
-            <a:r>
-              <a:rPr lang="es-PE" dirty="0"/>
-              <a:t>2</a:t>
-            </a:r>
-            <a:r>
-              <a:rPr lang="es-PE" dirty="0" smtClean="0"/>
-              <a:t>. Kant y la educación</a:t>
-            </a:r>
-            <a:br>
-              <a:rPr lang="es-PE" dirty="0" smtClean="0"/>
-            </a:br>
-            <a:r>
-              <a:rPr lang="es-PE" dirty="0"/>
-              <a:t/>
-            </a:r>
-            <a:br>
-              <a:rPr lang="es-PE" dirty="0"/>
-            </a:br>
-            <a:r>
-              <a:rPr lang="es-PE" dirty="0" smtClean="0"/>
-              <a:t>2.1 Kant como educador</a:t>
-            </a:r>
-            <a:br>
-              <a:rPr lang="es-PE" dirty="0" smtClean="0"/>
-            </a:br>
-            <a:r>
-              <a:rPr lang="es-PE" dirty="0" smtClean="0"/>
-              <a:t>2.2 </a:t>
-            </a:r>
-            <a:r>
-              <a:rPr lang="es-PE" dirty="0" smtClean="0">
-                <a:solidFill>
-                  <a:srgbClr val="FF0000"/>
-                </a:solidFill>
-              </a:rPr>
-              <a:t>Ideas de las “Lecciones sobre pedagogía”</a:t>
-            </a:r>
-            <a:r>
-              <a:rPr lang="es-PE" dirty="0" smtClean="0"/>
-              <a:t/>
-            </a:r>
-            <a:br>
-              <a:rPr lang="es-PE" dirty="0" smtClean="0"/>
-            </a:br>
-            <a:r>
-              <a:rPr lang="es-PE" dirty="0" smtClean="0"/>
-              <a:t>2.3 Conceptos del proyecto crítico y la filosofía política para la educación</a:t>
-            </a:r>
-            <a:endParaRPr lang="es-PE" dirty="0"/>
-          </a:p>
-        </p:txBody>
-      </p:sp>
-    </p:spTree>
-    <p:extLst>
-      <p:ext uri="{BB962C8B-B14F-4D97-AF65-F5344CB8AC3E}">
-        <p14:creationId xmlns:p14="http://schemas.microsoft.com/office/powerpoint/2010/main" val="1219000568"/>
       </p:ext>
     </p:extLst>
   </p:cSld>
@@ -5034,7 +6435,40 @@
       </a:bgFillStyleLst>
     </a:fmtScheme>
   </a:themeElements>
-  <a:objectDefaults/>
+  <a:objectDefaults>
+    <a:spDef>
+      <a:spPr>
+        <a:noFill/>
+        <a:ln w="76200">
+          <a:solidFill>
+            <a:srgbClr val="FF0000"/>
+          </a:solidFill>
+        </a:ln>
+      </a:spPr>
+      <a:bodyPr rtlCol="0" anchor="ctr"/>
+      <a:lstStyle>
+        <a:defPPr algn="ctr">
+          <a:defRPr/>
+        </a:defPPr>
+      </a:lstStyle>
+      <a:style>
+        <a:lnRef idx="2">
+          <a:schemeClr val="accent1">
+            <a:shade val="50000"/>
+          </a:schemeClr>
+        </a:lnRef>
+        <a:fillRef idx="1">
+          <a:schemeClr val="accent1"/>
+        </a:fillRef>
+        <a:effectRef idx="0">
+          <a:schemeClr val="accent1"/>
+        </a:effectRef>
+        <a:fontRef idx="minor">
+          <a:schemeClr val="lt1"/>
+        </a:fontRef>
+      </a:style>
+    </a:spDef>
+  </a:objectDefaults>
   <a:extraClrSchemeLst/>
   <a:extLst>
     <a:ext uri="{05A4C25C-085E-4340-85A3-A5531E510DB2}">

</xml_diff>